<commit_message>
8 papers Lit review done
</commit_message>
<xml_diff>
--- a/Literature Review.pptx
+++ b/Literature Review.pptx
@@ -4,9 +4,14 @@
   <p:sldMasterIdLst>
     <p:sldMasterId id="2147483648" r:id="rId1"/>
   </p:sldMasterIdLst>
+  <p:notesMasterIdLst>
+    <p:notesMasterId r:id="rId6"/>
+  </p:notesMasterIdLst>
   <p:sldIdLst>
     <p:sldId id="256" r:id="rId2"/>
-    <p:sldId id="257" r:id="rId3"/>
+    <p:sldId id="258" r:id="rId3"/>
+    <p:sldId id="257" r:id="rId4"/>
+    <p:sldId id="259" r:id="rId5"/>
   </p:sldIdLst>
   <p:sldSz cx="9144000" cy="6858000" type="screen4x3"/>
   <p:notesSz cx="6858000" cy="9144000"/>
@@ -124,6 +129,440 @@
 </p:presentation>
 </file>
 
+<file path=ppt/notesMasters/notesMaster1.xml><?xml version="1.0" encoding="utf-8"?>
+<p:notesMaster xmlns:a="http://schemas.openxmlformats.org/drawingml/2006/main" xmlns:r="http://schemas.openxmlformats.org/officeDocument/2006/relationships" xmlns:p="http://schemas.openxmlformats.org/presentationml/2006/main">
+  <p:cSld>
+    <p:bg>
+      <p:bgRef idx="1001">
+        <a:schemeClr val="bg1"/>
+      </p:bgRef>
+    </p:bg>
+    <p:spTree>
+      <p:nvGrpSpPr>
+        <p:cNvPr id="1" name=""/>
+        <p:cNvGrpSpPr/>
+        <p:nvPr/>
+      </p:nvGrpSpPr>
+      <p:grpSpPr>
+        <a:xfrm>
+          <a:off x="0" y="0"/>
+          <a:ext cx="0" cy="0"/>
+          <a:chOff x="0" y="0"/>
+          <a:chExt cx="0" cy="0"/>
+        </a:xfrm>
+      </p:grpSpPr>
+      <p:sp>
+        <p:nvSpPr>
+          <p:cNvPr id="2" name="Header Placeholder 1"/>
+          <p:cNvSpPr>
+            <a:spLocks noGrp="1"/>
+          </p:cNvSpPr>
+          <p:nvPr>
+            <p:ph type="hdr" sz="quarter"/>
+          </p:nvPr>
+        </p:nvSpPr>
+        <p:spPr>
+          <a:xfrm>
+            <a:off x="0" y="0"/>
+            <a:ext cx="2971800" cy="458788"/>
+          </a:xfrm>
+          <a:prstGeom prst="rect">
+            <a:avLst/>
+          </a:prstGeom>
+        </p:spPr>
+        <p:txBody>
+          <a:bodyPr vert="horz" lIns="91440" tIns="45720" rIns="91440" bIns="45720" rtlCol="0"/>
+          <a:lstStyle>
+            <a:lvl1pPr algn="l">
+              <a:defRPr sz="1200"/>
+            </a:lvl1pPr>
+          </a:lstStyle>
+          <a:p>
+            <a:endParaRPr lang="en-US"/>
+          </a:p>
+        </p:txBody>
+      </p:sp>
+      <p:sp>
+        <p:nvSpPr>
+          <p:cNvPr id="3" name="Date Placeholder 2"/>
+          <p:cNvSpPr>
+            <a:spLocks noGrp="1"/>
+          </p:cNvSpPr>
+          <p:nvPr>
+            <p:ph type="dt" idx="1"/>
+          </p:nvPr>
+        </p:nvSpPr>
+        <p:spPr>
+          <a:xfrm>
+            <a:off x="3884613" y="0"/>
+            <a:ext cx="2971800" cy="458788"/>
+          </a:xfrm>
+          <a:prstGeom prst="rect">
+            <a:avLst/>
+          </a:prstGeom>
+        </p:spPr>
+        <p:txBody>
+          <a:bodyPr vert="horz" lIns="91440" tIns="45720" rIns="91440" bIns="45720" rtlCol="0"/>
+          <a:lstStyle>
+            <a:lvl1pPr algn="r">
+              <a:defRPr sz="1200"/>
+            </a:lvl1pPr>
+          </a:lstStyle>
+          <a:p>
+            <a:fld id="{2D57F4FE-57CB-604D-B747-DCC97EBE4C9E}" type="datetimeFigureOut">
+              <a:rPr lang="en-US" smtClean="0"/>
+              <a:t>2/16/16</a:t>
+            </a:fld>
+            <a:endParaRPr lang="en-US"/>
+          </a:p>
+        </p:txBody>
+      </p:sp>
+      <p:sp>
+        <p:nvSpPr>
+          <p:cNvPr id="4" name="Slide Image Placeholder 3"/>
+          <p:cNvSpPr>
+            <a:spLocks noGrp="1" noRot="1" noChangeAspect="1"/>
+          </p:cNvSpPr>
+          <p:nvPr>
+            <p:ph type="sldImg" idx="2"/>
+          </p:nvPr>
+        </p:nvSpPr>
+        <p:spPr>
+          <a:xfrm>
+            <a:off x="1371600" y="1143000"/>
+            <a:ext cx="4114800" cy="3086100"/>
+          </a:xfrm>
+          <a:prstGeom prst="rect">
+            <a:avLst/>
+          </a:prstGeom>
+          <a:noFill/>
+          <a:ln w="12700">
+            <a:solidFill>
+              <a:prstClr val="black"/>
+            </a:solidFill>
+          </a:ln>
+        </p:spPr>
+        <p:txBody>
+          <a:bodyPr vert="horz" lIns="91440" tIns="45720" rIns="91440" bIns="45720" rtlCol="0" anchor="ctr"/>
+          <a:lstStyle/>
+          <a:p>
+            <a:endParaRPr lang="en-US"/>
+          </a:p>
+        </p:txBody>
+      </p:sp>
+      <p:sp>
+        <p:nvSpPr>
+          <p:cNvPr id="5" name="Notes Placeholder 4"/>
+          <p:cNvSpPr>
+            <a:spLocks noGrp="1"/>
+          </p:cNvSpPr>
+          <p:nvPr>
+            <p:ph type="body" sz="quarter" idx="3"/>
+          </p:nvPr>
+        </p:nvSpPr>
+        <p:spPr>
+          <a:xfrm>
+            <a:off x="685800" y="4400550"/>
+            <a:ext cx="5486400" cy="3600450"/>
+          </a:xfrm>
+          <a:prstGeom prst="rect">
+            <a:avLst/>
+          </a:prstGeom>
+        </p:spPr>
+        <p:txBody>
+          <a:bodyPr vert="horz" lIns="91440" tIns="45720" rIns="91440" bIns="45720" rtlCol="0"/>
+          <a:lstStyle/>
+          <a:p>
+            <a:pPr lvl="0"/>
+            <a:r>
+              <a:rPr lang="en-US" smtClean="0"/>
+              <a:t>Click to edit Master text styles</a:t>
+            </a:r>
+          </a:p>
+          <a:p>
+            <a:pPr lvl="1"/>
+            <a:r>
+              <a:rPr lang="en-US" smtClean="0"/>
+              <a:t>Second level</a:t>
+            </a:r>
+          </a:p>
+          <a:p>
+            <a:pPr lvl="2"/>
+            <a:r>
+              <a:rPr lang="en-US" smtClean="0"/>
+              <a:t>Third level</a:t>
+            </a:r>
+          </a:p>
+          <a:p>
+            <a:pPr lvl="3"/>
+            <a:r>
+              <a:rPr lang="en-US" smtClean="0"/>
+              <a:t>Fourth level</a:t>
+            </a:r>
+          </a:p>
+          <a:p>
+            <a:pPr lvl="4"/>
+            <a:r>
+              <a:rPr lang="en-US" smtClean="0"/>
+              <a:t>Fifth level</a:t>
+            </a:r>
+            <a:endParaRPr lang="en-US"/>
+          </a:p>
+        </p:txBody>
+      </p:sp>
+      <p:sp>
+        <p:nvSpPr>
+          <p:cNvPr id="6" name="Footer Placeholder 5"/>
+          <p:cNvSpPr>
+            <a:spLocks noGrp="1"/>
+          </p:cNvSpPr>
+          <p:nvPr>
+            <p:ph type="ftr" sz="quarter" idx="4"/>
+          </p:nvPr>
+        </p:nvSpPr>
+        <p:spPr>
+          <a:xfrm>
+            <a:off x="0" y="8685213"/>
+            <a:ext cx="2971800" cy="458787"/>
+          </a:xfrm>
+          <a:prstGeom prst="rect">
+            <a:avLst/>
+          </a:prstGeom>
+        </p:spPr>
+        <p:txBody>
+          <a:bodyPr vert="horz" lIns="91440" tIns="45720" rIns="91440" bIns="45720" rtlCol="0" anchor="b"/>
+          <a:lstStyle>
+            <a:lvl1pPr algn="l">
+              <a:defRPr sz="1200"/>
+            </a:lvl1pPr>
+          </a:lstStyle>
+          <a:p>
+            <a:endParaRPr lang="en-US"/>
+          </a:p>
+        </p:txBody>
+      </p:sp>
+      <p:sp>
+        <p:nvSpPr>
+          <p:cNvPr id="7" name="Slide Number Placeholder 6"/>
+          <p:cNvSpPr>
+            <a:spLocks noGrp="1"/>
+          </p:cNvSpPr>
+          <p:nvPr>
+            <p:ph type="sldNum" sz="quarter" idx="5"/>
+          </p:nvPr>
+        </p:nvSpPr>
+        <p:spPr>
+          <a:xfrm>
+            <a:off x="3884613" y="8685213"/>
+            <a:ext cx="2971800" cy="458787"/>
+          </a:xfrm>
+          <a:prstGeom prst="rect">
+            <a:avLst/>
+          </a:prstGeom>
+        </p:spPr>
+        <p:txBody>
+          <a:bodyPr vert="horz" lIns="91440" tIns="45720" rIns="91440" bIns="45720" rtlCol="0" anchor="b"/>
+          <a:lstStyle>
+            <a:lvl1pPr algn="r">
+              <a:defRPr sz="1200"/>
+            </a:lvl1pPr>
+          </a:lstStyle>
+          <a:p>
+            <a:fld id="{05D94884-059D-B245-A9FC-18EE4148307A}" type="slidenum">
+              <a:rPr lang="en-US" smtClean="0"/>
+              <a:t>‹#›</a:t>
+            </a:fld>
+            <a:endParaRPr lang="en-US"/>
+          </a:p>
+        </p:txBody>
+      </p:sp>
+    </p:spTree>
+    <p:extLst>
+      <p:ext uri="{BB962C8B-B14F-4D97-AF65-F5344CB8AC3E}">
+        <p14:creationId xmlns:p14="http://schemas.microsoft.com/office/powerpoint/2010/main" val="1603386966"/>
+      </p:ext>
+    </p:extLst>
+  </p:cSld>
+  <p:clrMap bg1="lt1" tx1="dk1" bg2="lt2" tx2="dk2" accent1="accent1" accent2="accent2" accent3="accent3" accent4="accent4" accent5="accent5" accent6="accent6" hlink="hlink" folHlink="folHlink"/>
+  <p:notesStyle>
+    <a:lvl1pPr marL="0" algn="l" defTabSz="914400" rtl="0" eaLnBrk="1" latinLnBrk="0" hangingPunct="1">
+      <a:defRPr sz="1200" kern="1200">
+        <a:solidFill>
+          <a:schemeClr val="tx1"/>
+        </a:solidFill>
+        <a:latin typeface="+mn-lt"/>
+        <a:ea typeface="+mn-ea"/>
+        <a:cs typeface="+mn-cs"/>
+      </a:defRPr>
+    </a:lvl1pPr>
+    <a:lvl2pPr marL="457200" algn="l" defTabSz="914400" rtl="0" eaLnBrk="1" latinLnBrk="0" hangingPunct="1">
+      <a:defRPr sz="1200" kern="1200">
+        <a:solidFill>
+          <a:schemeClr val="tx1"/>
+        </a:solidFill>
+        <a:latin typeface="+mn-lt"/>
+        <a:ea typeface="+mn-ea"/>
+        <a:cs typeface="+mn-cs"/>
+      </a:defRPr>
+    </a:lvl2pPr>
+    <a:lvl3pPr marL="914400" algn="l" defTabSz="914400" rtl="0" eaLnBrk="1" latinLnBrk="0" hangingPunct="1">
+      <a:defRPr sz="1200" kern="1200">
+        <a:solidFill>
+          <a:schemeClr val="tx1"/>
+        </a:solidFill>
+        <a:latin typeface="+mn-lt"/>
+        <a:ea typeface="+mn-ea"/>
+        <a:cs typeface="+mn-cs"/>
+      </a:defRPr>
+    </a:lvl3pPr>
+    <a:lvl4pPr marL="1371600" algn="l" defTabSz="914400" rtl="0" eaLnBrk="1" latinLnBrk="0" hangingPunct="1">
+      <a:defRPr sz="1200" kern="1200">
+        <a:solidFill>
+          <a:schemeClr val="tx1"/>
+        </a:solidFill>
+        <a:latin typeface="+mn-lt"/>
+        <a:ea typeface="+mn-ea"/>
+        <a:cs typeface="+mn-cs"/>
+      </a:defRPr>
+    </a:lvl4pPr>
+    <a:lvl5pPr marL="1828800" algn="l" defTabSz="914400" rtl="0" eaLnBrk="1" latinLnBrk="0" hangingPunct="1">
+      <a:defRPr sz="1200" kern="1200">
+        <a:solidFill>
+          <a:schemeClr val="tx1"/>
+        </a:solidFill>
+        <a:latin typeface="+mn-lt"/>
+        <a:ea typeface="+mn-ea"/>
+        <a:cs typeface="+mn-cs"/>
+      </a:defRPr>
+    </a:lvl5pPr>
+    <a:lvl6pPr marL="2286000" algn="l" defTabSz="914400" rtl="0" eaLnBrk="1" latinLnBrk="0" hangingPunct="1">
+      <a:defRPr sz="1200" kern="1200">
+        <a:solidFill>
+          <a:schemeClr val="tx1"/>
+        </a:solidFill>
+        <a:latin typeface="+mn-lt"/>
+        <a:ea typeface="+mn-ea"/>
+        <a:cs typeface="+mn-cs"/>
+      </a:defRPr>
+    </a:lvl6pPr>
+    <a:lvl7pPr marL="2743200" algn="l" defTabSz="914400" rtl="0" eaLnBrk="1" latinLnBrk="0" hangingPunct="1">
+      <a:defRPr sz="1200" kern="1200">
+        <a:solidFill>
+          <a:schemeClr val="tx1"/>
+        </a:solidFill>
+        <a:latin typeface="+mn-lt"/>
+        <a:ea typeface="+mn-ea"/>
+        <a:cs typeface="+mn-cs"/>
+      </a:defRPr>
+    </a:lvl7pPr>
+    <a:lvl8pPr marL="3200400" algn="l" defTabSz="914400" rtl="0" eaLnBrk="1" latinLnBrk="0" hangingPunct="1">
+      <a:defRPr sz="1200" kern="1200">
+        <a:solidFill>
+          <a:schemeClr val="tx1"/>
+        </a:solidFill>
+        <a:latin typeface="+mn-lt"/>
+        <a:ea typeface="+mn-ea"/>
+        <a:cs typeface="+mn-cs"/>
+      </a:defRPr>
+    </a:lvl8pPr>
+    <a:lvl9pPr marL="3657600" algn="l" defTabSz="914400" rtl="0" eaLnBrk="1" latinLnBrk="0" hangingPunct="1">
+      <a:defRPr sz="1200" kern="1200">
+        <a:solidFill>
+          <a:schemeClr val="tx1"/>
+        </a:solidFill>
+        <a:latin typeface="+mn-lt"/>
+        <a:ea typeface="+mn-ea"/>
+        <a:cs typeface="+mn-cs"/>
+      </a:defRPr>
+    </a:lvl9pPr>
+  </p:notesStyle>
+</p:notesMaster>
+</file>
+
+<file path=ppt/notesSlides/notesSlide1.xml><?xml version="1.0" encoding="utf-8"?>
+<p:notes xmlns:a="http://schemas.openxmlformats.org/drawingml/2006/main" xmlns:r="http://schemas.openxmlformats.org/officeDocument/2006/relationships" xmlns:p="http://schemas.openxmlformats.org/presentationml/2006/main">
+  <p:cSld>
+    <p:spTree>
+      <p:nvGrpSpPr>
+        <p:cNvPr id="1" name=""/>
+        <p:cNvGrpSpPr/>
+        <p:nvPr/>
+      </p:nvGrpSpPr>
+      <p:grpSpPr>
+        <a:xfrm>
+          <a:off x="0" y="0"/>
+          <a:ext cx="0" cy="0"/>
+          <a:chOff x="0" y="0"/>
+          <a:chExt cx="0" cy="0"/>
+        </a:xfrm>
+      </p:grpSpPr>
+      <p:sp>
+        <p:nvSpPr>
+          <p:cNvPr id="2" name="Slide Image Placeholder 1"/>
+          <p:cNvSpPr>
+            <a:spLocks noGrp="1" noRot="1" noChangeAspect="1"/>
+          </p:cNvSpPr>
+          <p:nvPr>
+            <p:ph type="sldImg"/>
+          </p:nvPr>
+        </p:nvSpPr>
+        <p:spPr/>
+      </p:sp>
+      <p:sp>
+        <p:nvSpPr>
+          <p:cNvPr id="3" name="Notes Placeholder 2"/>
+          <p:cNvSpPr>
+            <a:spLocks noGrp="1"/>
+          </p:cNvSpPr>
+          <p:nvPr>
+            <p:ph type="body" idx="1"/>
+          </p:nvPr>
+        </p:nvSpPr>
+        <p:spPr/>
+        <p:txBody>
+          <a:bodyPr/>
+          <a:lstStyle/>
+          <a:p>
+            <a:endParaRPr lang="en-US"/>
+          </a:p>
+        </p:txBody>
+      </p:sp>
+      <p:sp>
+        <p:nvSpPr>
+          <p:cNvPr id="4" name="Slide Number Placeholder 3"/>
+          <p:cNvSpPr>
+            <a:spLocks noGrp="1"/>
+          </p:cNvSpPr>
+          <p:nvPr>
+            <p:ph type="sldNum" sz="quarter" idx="10"/>
+          </p:nvPr>
+        </p:nvSpPr>
+        <p:spPr/>
+        <p:txBody>
+          <a:bodyPr/>
+          <a:lstStyle/>
+          <a:p>
+            <a:fld id="{05D94884-059D-B245-A9FC-18EE4148307A}" type="slidenum">
+              <a:rPr lang="en-US" smtClean="0"/>
+              <a:t>1</a:t>
+            </a:fld>
+            <a:endParaRPr lang="en-US"/>
+          </a:p>
+        </p:txBody>
+      </p:sp>
+    </p:spTree>
+    <p:extLst>
+      <p:ext uri="{BB962C8B-B14F-4D97-AF65-F5344CB8AC3E}">
+        <p14:creationId xmlns:p14="http://schemas.microsoft.com/office/powerpoint/2010/main" val="1010764797"/>
+      </p:ext>
+    </p:extLst>
+  </p:cSld>
+  <p:clrMapOvr>
+    <a:masterClrMapping/>
+  </p:clrMapOvr>
+</p:notes>
+</file>
+
 <file path=ppt/slideLayouts/slideLayout1.xml><?xml version="1.0" encoding="utf-8"?>
 <p:sldLayout xmlns:a="http://schemas.openxmlformats.org/drawingml/2006/main" xmlns:r="http://schemas.openxmlformats.org/officeDocument/2006/relationships" xmlns:p="http://schemas.openxmlformats.org/presentationml/2006/main" type="title" preserve="1">
   <p:cSld name="Title Slide">
@@ -303,9 +742,9 @@
           <a:bodyPr/>
           <a:lstStyle/>
           <a:p>
-            <a:fld id="{D97320BB-2371-4378-90A1-95C55AC57BA6}" type="datetimeFigureOut">
-              <a:rPr lang="en-US" smtClean="0"/>
-              <a:t>2/15/16</a:t>
+            <a:fld id="{FD06F17A-881D-D344-8AF6-FD33B3EB18B9}" type="datetime1">
+              <a:rPr lang="en-IN" smtClean="0"/>
+              <a:t>16/02/16</a:t>
             </a:fld>
             <a:endParaRPr lang="en-US"/>
           </a:p>
@@ -473,9 +912,9 @@
           <a:bodyPr/>
           <a:lstStyle/>
           <a:p>
-            <a:fld id="{D97320BB-2371-4378-90A1-95C55AC57BA6}" type="datetimeFigureOut">
-              <a:rPr lang="en-US" smtClean="0"/>
-              <a:t>2/15/16</a:t>
+            <a:fld id="{25489BC2-0CEF-F845-BBAB-829F7A24C60D}" type="datetime1">
+              <a:rPr lang="en-IN" smtClean="0"/>
+              <a:t>16/02/16</a:t>
             </a:fld>
             <a:endParaRPr lang="en-US"/>
           </a:p>
@@ -653,9 +1092,9 @@
           <a:bodyPr/>
           <a:lstStyle/>
           <a:p>
-            <a:fld id="{D97320BB-2371-4378-90A1-95C55AC57BA6}" type="datetimeFigureOut">
-              <a:rPr lang="en-US" smtClean="0"/>
-              <a:t>2/15/16</a:t>
+            <a:fld id="{FEB8822C-B0ED-9941-B8C2-A15DF62DAC5B}" type="datetime1">
+              <a:rPr lang="en-IN" smtClean="0"/>
+              <a:t>16/02/16</a:t>
             </a:fld>
             <a:endParaRPr lang="en-US"/>
           </a:p>
@@ -823,9 +1262,9 @@
           <a:bodyPr/>
           <a:lstStyle/>
           <a:p>
-            <a:fld id="{D97320BB-2371-4378-90A1-95C55AC57BA6}" type="datetimeFigureOut">
-              <a:rPr lang="en-US" smtClean="0"/>
-              <a:t>2/15/16</a:t>
+            <a:fld id="{9F3CB589-D9A0-1741-98C5-1F15A82DECE1}" type="datetime1">
+              <a:rPr lang="en-IN" smtClean="0"/>
+              <a:t>16/02/16</a:t>
             </a:fld>
             <a:endParaRPr lang="en-US"/>
           </a:p>
@@ -1069,9 +1508,9 @@
           <a:bodyPr/>
           <a:lstStyle/>
           <a:p>
-            <a:fld id="{D97320BB-2371-4378-90A1-95C55AC57BA6}" type="datetimeFigureOut">
-              <a:rPr lang="en-US" smtClean="0"/>
-              <a:t>2/15/16</a:t>
+            <a:fld id="{8622B643-780C-0642-8060-8CBB9C196463}" type="datetime1">
+              <a:rPr lang="en-IN" smtClean="0"/>
+              <a:t>16/02/16</a:t>
             </a:fld>
             <a:endParaRPr lang="en-US"/>
           </a:p>
@@ -1357,9 +1796,9 @@
           <a:bodyPr/>
           <a:lstStyle/>
           <a:p>
-            <a:fld id="{D97320BB-2371-4378-90A1-95C55AC57BA6}" type="datetimeFigureOut">
-              <a:rPr lang="en-US" smtClean="0"/>
-              <a:t>2/15/16</a:t>
+            <a:fld id="{0C9554B5-234A-9847-9891-50A24405DD0B}" type="datetime1">
+              <a:rPr lang="en-IN" smtClean="0"/>
+              <a:t>16/02/16</a:t>
             </a:fld>
             <a:endParaRPr lang="en-US"/>
           </a:p>
@@ -1779,9 +2218,9 @@
           <a:bodyPr/>
           <a:lstStyle/>
           <a:p>
-            <a:fld id="{D97320BB-2371-4378-90A1-95C55AC57BA6}" type="datetimeFigureOut">
-              <a:rPr lang="en-US" smtClean="0"/>
-              <a:t>2/15/16</a:t>
+            <a:fld id="{54900472-F439-E847-9855-9FD005DF2E25}" type="datetime1">
+              <a:rPr lang="en-IN" smtClean="0"/>
+              <a:t>16/02/16</a:t>
             </a:fld>
             <a:endParaRPr lang="en-US"/>
           </a:p>
@@ -1897,9 +2336,9 @@
           <a:bodyPr/>
           <a:lstStyle/>
           <a:p>
-            <a:fld id="{D97320BB-2371-4378-90A1-95C55AC57BA6}" type="datetimeFigureOut">
-              <a:rPr lang="en-US" smtClean="0"/>
-              <a:t>2/15/16</a:t>
+            <a:fld id="{D7C90479-D526-9746-9552-C31F836C06B2}" type="datetime1">
+              <a:rPr lang="en-IN" smtClean="0"/>
+              <a:t>16/02/16</a:t>
             </a:fld>
             <a:endParaRPr lang="en-US"/>
           </a:p>
@@ -1992,9 +2431,9 @@
           <a:bodyPr/>
           <a:lstStyle/>
           <a:p>
-            <a:fld id="{D97320BB-2371-4378-90A1-95C55AC57BA6}" type="datetimeFigureOut">
-              <a:rPr lang="en-US" smtClean="0"/>
-              <a:t>2/15/16</a:t>
+            <a:fld id="{5DD8DB9B-717B-8B43-AEF2-A5D75DE90877}" type="datetime1">
+              <a:rPr lang="en-IN" smtClean="0"/>
+              <a:t>16/02/16</a:t>
             </a:fld>
             <a:endParaRPr lang="en-US"/>
           </a:p>
@@ -2269,9 +2708,9 @@
           <a:bodyPr/>
           <a:lstStyle/>
           <a:p>
-            <a:fld id="{D97320BB-2371-4378-90A1-95C55AC57BA6}" type="datetimeFigureOut">
-              <a:rPr lang="en-US" smtClean="0"/>
-              <a:t>2/15/16</a:t>
+            <a:fld id="{FC2C3E1E-9433-D04F-8D18-50861D5AA2B4}" type="datetime1">
+              <a:rPr lang="en-IN" smtClean="0"/>
+              <a:t>16/02/16</a:t>
             </a:fld>
             <a:endParaRPr lang="en-US"/>
           </a:p>
@@ -2522,9 +2961,9 @@
           <a:bodyPr/>
           <a:lstStyle/>
           <a:p>
-            <a:fld id="{D97320BB-2371-4378-90A1-95C55AC57BA6}" type="datetimeFigureOut">
-              <a:rPr lang="en-US" smtClean="0"/>
-              <a:t>2/15/16</a:t>
+            <a:fld id="{62B0E4EA-2985-104B-936B-492CDA6CAB21}" type="datetime1">
+              <a:rPr lang="en-IN" smtClean="0"/>
+              <a:t>16/02/16</a:t>
             </a:fld>
             <a:endParaRPr lang="en-US"/>
           </a:p>
@@ -2735,9 +3174,9 @@
             </a:lvl1pPr>
           </a:lstStyle>
           <a:p>
-            <a:fld id="{D97320BB-2371-4378-90A1-95C55AC57BA6}" type="datetimeFigureOut">
-              <a:rPr lang="en-US" smtClean="0"/>
-              <a:t>2/15/16</a:t>
+            <a:fld id="{5CFAB831-C52E-1B49-A60A-526827E42E48}" type="datetime1">
+              <a:rPr lang="en-IN" smtClean="0"/>
+              <a:t>16/02/16</a:t>
             </a:fld>
             <a:endParaRPr lang="en-US"/>
           </a:p>
@@ -2842,6 +3281,7 @@
     <p:sldLayoutId id="2147483658" r:id="rId10"/>
     <p:sldLayoutId id="2147483659" r:id="rId11"/>
   </p:sldLayoutIdLst>
+  <p:hf hdr="0" ftr="0" dt="0"/>
   <p:txStyles>
     <p:titleStyle>
       <a:lvl1pPr algn="ctr" defTabSz="914400" rtl="0" eaLnBrk="1" latinLnBrk="0" hangingPunct="1">
@@ -4019,13 +4459,32 @@
             <a:pPr algn="l"/>
             <a:r>
               <a:rPr lang="en-US" dirty="0" smtClean="0"/>
-              <a:t>Literature </a:t>
-            </a:r>
-            <a:r>
-              <a:rPr lang="en-US" dirty="0" smtClean="0"/>
-              <a:t>Survey</a:t>
+              <a:t>Literature Survey</a:t>
             </a:r>
             <a:endParaRPr lang="en-US" dirty="0"/>
+          </a:p>
+        </p:txBody>
+      </p:sp>
+      <p:sp>
+        <p:nvSpPr>
+          <p:cNvPr id="2" name="Slide Number Placeholder 1"/>
+          <p:cNvSpPr>
+            <a:spLocks noGrp="1"/>
+          </p:cNvSpPr>
+          <p:nvPr>
+            <p:ph type="sldNum" sz="quarter" idx="12"/>
+          </p:nvPr>
+        </p:nvSpPr>
+        <p:spPr/>
+        <p:txBody>
+          <a:bodyPr/>
+          <a:lstStyle/>
+          <a:p>
+            <a:fld id="{3E144E38-9B7E-4F9B-8E28-ACBFB64687FB}" type="slidenum">
+              <a:rPr lang="en-US" smtClean="0"/>
+              <a:t>1</a:t>
+            </a:fld>
+            <a:endParaRPr lang="en-US"/>
           </a:p>
         </p:txBody>
       </p:sp>
@@ -4068,7 +4527,7 @@
           <p:nvPr>
             <p:extLst>
               <p:ext uri="{D42A27DB-BD31-4B8C-83A1-F6EECF244321}">
-                <p14:modId xmlns:p14="http://schemas.microsoft.com/office/powerpoint/2010/main" val="1724916170"/>
+                <p14:modId xmlns:p14="http://schemas.microsoft.com/office/powerpoint/2010/main" val="135497281"/>
               </p:ext>
             </p:extLst>
           </p:nvPr>
@@ -4489,7 +4948,7 @@
                           <a:ea typeface="+mn-ea"/>
                           <a:cs typeface="+mn-cs"/>
                         </a:rPr>
-                        <a:t>MOG [4]</a:t>
+                        <a:t>REST API over Geo2Taga</a:t>
                       </a:r>
                       <a:endParaRPr lang="en-US" sz="1400" dirty="0">
                         <a:latin typeface="+mn-lt"/>
@@ -4766,7 +5225,7 @@
                           <a:ea typeface="+mn-ea"/>
                           <a:cs typeface="+mn-cs"/>
                         </a:rPr>
-                        <a:t>KDE [5]</a:t>
+                        <a:t>OSGAC</a:t>
                       </a:r>
                       <a:endParaRPr kumimoji="0" lang="en-US" sz="1400" kern="1200" dirty="0">
                         <a:solidFill>
@@ -4882,7 +5341,7 @@
                         <a:t> for only e-Science data </a:t>
                       </a:r>
                       <a:r>
-                        <a:rPr lang="en-US" sz="1400" kern="150" baseline="0" smtClean="0">
+                        <a:rPr lang="en-US" sz="1400" kern="150" baseline="0" dirty="0" err="1" smtClean="0">
                           <a:latin typeface="+mn-lt"/>
                           <a:ea typeface="Droid Sans Fallback"/>
                           <a:cs typeface="FreeSans"/>
@@ -4951,13 +5410,985 @@
             <a:pPr algn="l"/>
             <a:r>
               <a:rPr lang="en-US" dirty="0" smtClean="0"/>
-              <a:t>Literature </a:t>
+              <a:t>Literature Survey</a:t>
             </a:r>
+            <a:endParaRPr lang="en-US" dirty="0"/>
+          </a:p>
+        </p:txBody>
+      </p:sp>
+      <p:sp>
+        <p:nvSpPr>
+          <p:cNvPr id="2" name="Slide Number Placeholder 1"/>
+          <p:cNvSpPr>
+            <a:spLocks noGrp="1"/>
+          </p:cNvSpPr>
+          <p:nvPr>
+            <p:ph type="sldNum" sz="quarter" idx="12"/>
+          </p:nvPr>
+        </p:nvSpPr>
+        <p:spPr/>
+        <p:txBody>
+          <a:bodyPr/>
+          <a:lstStyle/>
+          <a:p>
+            <a:fld id="{3E144E38-9B7E-4F9B-8E28-ACBFB64687FB}" type="slidenum">
+              <a:rPr lang="en-US" smtClean="0"/>
+              <a:t>2</a:t>
+            </a:fld>
+            <a:endParaRPr lang="en-US"/>
+          </a:p>
+        </p:txBody>
+      </p:sp>
+    </p:spTree>
+    <p:extLst>
+      <p:ext uri="{BB962C8B-B14F-4D97-AF65-F5344CB8AC3E}">
+        <p14:creationId xmlns:p14="http://schemas.microsoft.com/office/powerpoint/2010/main" val="1934660183"/>
+      </p:ext>
+    </p:extLst>
+  </p:cSld>
+  <p:clrMapOvr>
+    <a:masterClrMapping/>
+  </p:clrMapOvr>
+</p:sld>
+</file>
+
+<file path=ppt/slides/slide3.xml><?xml version="1.0" encoding="utf-8"?>
+<p:sld xmlns:a="http://schemas.openxmlformats.org/drawingml/2006/main" xmlns:r="http://schemas.openxmlformats.org/officeDocument/2006/relationships" xmlns:p="http://schemas.openxmlformats.org/presentationml/2006/main">
+  <p:cSld>
+    <p:spTree>
+      <p:nvGrpSpPr>
+        <p:cNvPr id="1" name=""/>
+        <p:cNvGrpSpPr/>
+        <p:nvPr/>
+      </p:nvGrpSpPr>
+      <p:grpSpPr>
+        <a:xfrm>
+          <a:off x="0" y="0"/>
+          <a:ext cx="0" cy="0"/>
+          <a:chOff x="0" y="0"/>
+          <a:chExt cx="0" cy="0"/>
+        </a:xfrm>
+      </p:grpSpPr>
+      <p:graphicFrame>
+        <p:nvGraphicFramePr>
+          <p:cNvPr id="4" name="Table 3"/>
+          <p:cNvGraphicFramePr>
+            <a:graphicFrameLocks noGrp="1"/>
+          </p:cNvGraphicFramePr>
+          <p:nvPr>
+            <p:extLst>
+              <p:ext uri="{D42A27DB-BD31-4B8C-83A1-F6EECF244321}">
+                <p14:modId xmlns:p14="http://schemas.microsoft.com/office/powerpoint/2010/main" val="928140528"/>
+              </p:ext>
+            </p:extLst>
+          </p:nvPr>
+        </p:nvGraphicFramePr>
+        <p:xfrm>
+          <a:off x="434788" y="1177245"/>
+          <a:ext cx="8305801" cy="4268416"/>
+        </p:xfrm>
+        <a:graphic>
+          <a:graphicData uri="http://schemas.openxmlformats.org/drawingml/2006/table">
+            <a:tbl>
+              <a:tblPr firstRow="1" bandRow="1">
+                <a:tableStyleId>{5C22544A-7EE6-4342-B048-85BDC9FD1C3A}</a:tableStyleId>
+              </a:tblPr>
+              <a:tblGrid>
+                <a:gridCol w="1384300"/>
+                <a:gridCol w="1381312"/>
+                <a:gridCol w="1387288"/>
+                <a:gridCol w="1131059"/>
+                <a:gridCol w="1414017"/>
+                <a:gridCol w="1607825"/>
+              </a:tblGrid>
+              <a:tr h="950214">
+                <a:tc>
+                  <a:txBody>
+                    <a:bodyPr/>
+                    <a:lstStyle/>
+                    <a:p>
+                      <a:pPr marL="0" marR="0" algn="ctr">
+                        <a:lnSpc>
+                          <a:spcPct val="115000"/>
+                        </a:lnSpc>
+                        <a:spcBef>
+                          <a:spcPts val="0"/>
+                        </a:spcBef>
+                        <a:spcAft>
+                          <a:spcPts val="0"/>
+                        </a:spcAft>
+                      </a:pPr>
+                      <a:r>
+                        <a:rPr lang="en-US" sz="1400" dirty="0" smtClean="0">
+                          <a:latin typeface="Times New Roman" pitchFamily="18" charset="0"/>
+                          <a:ea typeface="Calibri"/>
+                          <a:cs typeface="Times New Roman"/>
+                        </a:rPr>
+                        <a:t>Year,</a:t>
+                      </a:r>
+                      <a:r>
+                        <a:rPr lang="en-US" sz="1400" baseline="0" dirty="0" smtClean="0">
+                          <a:latin typeface="Times New Roman" pitchFamily="18" charset="0"/>
+                          <a:ea typeface="Calibri"/>
+                          <a:cs typeface="Times New Roman"/>
+                        </a:rPr>
+                        <a:t> Name  of the Journal/Conference </a:t>
+                      </a:r>
+                      <a:endParaRPr lang="en-US" sz="1400" dirty="0">
+                        <a:latin typeface="Times New Roman" pitchFamily="18" charset="0"/>
+                        <a:ea typeface="Calibri"/>
+                        <a:cs typeface="Times New Roman"/>
+                      </a:endParaRPr>
+                    </a:p>
+                  </a:txBody>
+                  <a:tcPr marL="68580" marR="68580" marT="0" marB="0">
+                    <a:solidFill>
+                      <a:schemeClr val="accent3">
+                        <a:lumMod val="40000"/>
+                        <a:lumOff val="60000"/>
+                      </a:schemeClr>
+                    </a:solidFill>
+                  </a:tcPr>
+                </a:tc>
+                <a:tc>
+                  <a:txBody>
+                    <a:bodyPr/>
+                    <a:lstStyle/>
+                    <a:p>
+                      <a:pPr marL="0" marR="0" algn="ctr">
+                        <a:lnSpc>
+                          <a:spcPct val="115000"/>
+                        </a:lnSpc>
+                        <a:spcBef>
+                          <a:spcPts val="0"/>
+                        </a:spcBef>
+                        <a:spcAft>
+                          <a:spcPts val="0"/>
+                        </a:spcAft>
+                      </a:pPr>
+                      <a:r>
+                        <a:rPr lang="en-US" sz="1400" dirty="0" smtClean="0">
+                          <a:latin typeface="Times New Roman" pitchFamily="18" charset="0"/>
+                          <a:ea typeface="Calibri"/>
+                          <a:cs typeface="Times New Roman"/>
+                        </a:rPr>
+                        <a:t>Title of the paper</a:t>
+                      </a:r>
+                      <a:endParaRPr lang="en-US" sz="1400" dirty="0">
+                        <a:latin typeface="Times New Roman" pitchFamily="18" charset="0"/>
+                        <a:ea typeface="Calibri"/>
+                        <a:cs typeface="Times New Roman"/>
+                      </a:endParaRPr>
+                    </a:p>
+                  </a:txBody>
+                  <a:tcPr marL="68580" marR="68580" marT="0" marB="0">
+                    <a:solidFill>
+                      <a:schemeClr val="accent3">
+                        <a:lumMod val="40000"/>
+                        <a:lumOff val="60000"/>
+                      </a:schemeClr>
+                    </a:solidFill>
+                  </a:tcPr>
+                </a:tc>
+                <a:tc>
+                  <a:txBody>
+                    <a:bodyPr/>
+                    <a:lstStyle/>
+                    <a:p>
+                      <a:pPr marL="0" marR="0" algn="ctr">
+                        <a:lnSpc>
+                          <a:spcPct val="115000"/>
+                        </a:lnSpc>
+                        <a:spcBef>
+                          <a:spcPts val="0"/>
+                        </a:spcBef>
+                        <a:spcAft>
+                          <a:spcPts val="0"/>
+                        </a:spcAft>
+                      </a:pPr>
+                      <a:r>
+                        <a:rPr lang="en-US" sz="1400" dirty="0" smtClean="0">
+                          <a:latin typeface="Times New Roman" pitchFamily="18" charset="0"/>
+                          <a:ea typeface="Calibri"/>
+                          <a:cs typeface="Times New Roman"/>
+                        </a:rPr>
+                        <a:t>Authors of the paper</a:t>
+                      </a:r>
+                      <a:endParaRPr lang="en-US" sz="1400" dirty="0">
+                        <a:latin typeface="Times New Roman" pitchFamily="18" charset="0"/>
+                        <a:ea typeface="Calibri"/>
+                        <a:cs typeface="Times New Roman"/>
+                      </a:endParaRPr>
+                    </a:p>
+                  </a:txBody>
+                  <a:tcPr marL="68580" marR="68580" marT="0" marB="0">
+                    <a:solidFill>
+                      <a:schemeClr val="accent3">
+                        <a:lumMod val="40000"/>
+                        <a:lumOff val="60000"/>
+                      </a:schemeClr>
+                    </a:solidFill>
+                  </a:tcPr>
+                </a:tc>
+                <a:tc>
+                  <a:txBody>
+                    <a:bodyPr/>
+                    <a:lstStyle/>
+                    <a:p>
+                      <a:pPr marL="342900" marR="0" lvl="0" indent="-342900" algn="ctr">
+                        <a:lnSpc>
+                          <a:spcPct val="115000"/>
+                        </a:lnSpc>
+                        <a:spcBef>
+                          <a:spcPts val="0"/>
+                        </a:spcBef>
+                        <a:spcAft>
+                          <a:spcPts val="0"/>
+                        </a:spcAft>
+                        <a:buFont typeface="Wingdings"/>
+                        <a:buNone/>
+                      </a:pPr>
+                      <a:r>
+                        <a:rPr lang="en-US" sz="1400" dirty="0" smtClean="0">
+                          <a:latin typeface="Times New Roman" pitchFamily="18" charset="0"/>
+                          <a:ea typeface="Calibri"/>
+                          <a:cs typeface="Times New Roman"/>
+                        </a:rPr>
+                        <a:t>Model/Sub</a:t>
+                      </a:r>
+                      <a:r>
+                        <a:rPr lang="en-US" sz="1400" baseline="0" dirty="0" smtClean="0">
+                          <a:latin typeface="Times New Roman" pitchFamily="18" charset="0"/>
+                          <a:ea typeface="Calibri"/>
+                          <a:cs typeface="Times New Roman"/>
+                        </a:rPr>
+                        <a:t> Model used</a:t>
+                      </a:r>
+                      <a:endParaRPr lang="en-US" sz="1400" dirty="0">
+                        <a:latin typeface="Times New Roman" pitchFamily="18" charset="0"/>
+                        <a:ea typeface="Calibri"/>
+                        <a:cs typeface="Times New Roman"/>
+                      </a:endParaRPr>
+                    </a:p>
+                  </a:txBody>
+                  <a:tcPr marL="68580" marR="68580" marT="0" marB="0">
+                    <a:solidFill>
+                      <a:schemeClr val="accent3">
+                        <a:lumMod val="40000"/>
+                        <a:lumOff val="60000"/>
+                      </a:schemeClr>
+                    </a:solidFill>
+                  </a:tcPr>
+                </a:tc>
+                <a:tc>
+                  <a:txBody>
+                    <a:bodyPr/>
+                    <a:lstStyle/>
+                    <a:p>
+                      <a:pPr marL="342900" marR="0" lvl="0" indent="-342900" algn="ctr">
+                        <a:lnSpc>
+                          <a:spcPct val="115000"/>
+                        </a:lnSpc>
+                        <a:spcBef>
+                          <a:spcPts val="0"/>
+                        </a:spcBef>
+                        <a:spcAft>
+                          <a:spcPts val="0"/>
+                        </a:spcAft>
+                        <a:buFont typeface="Wingdings"/>
+                        <a:buNone/>
+                      </a:pPr>
+                      <a:r>
+                        <a:rPr lang="en-US" sz="1400" dirty="0" smtClean="0">
+                          <a:latin typeface="Times New Roman" pitchFamily="18" charset="0"/>
+                          <a:ea typeface="Calibri"/>
+                          <a:cs typeface="Times New Roman"/>
+                        </a:rPr>
+                        <a:t>Challenges of the paper</a:t>
+                      </a:r>
+                      <a:endParaRPr lang="en-US" sz="1400" dirty="0">
+                        <a:latin typeface="Times New Roman" pitchFamily="18" charset="0"/>
+                        <a:ea typeface="Calibri"/>
+                        <a:cs typeface="Times New Roman"/>
+                      </a:endParaRPr>
+                    </a:p>
+                  </a:txBody>
+                  <a:tcPr marL="68580" marR="68580" marT="0" marB="0">
+                    <a:solidFill>
+                      <a:schemeClr val="accent3">
+                        <a:lumMod val="40000"/>
+                        <a:lumOff val="60000"/>
+                      </a:schemeClr>
+                    </a:solidFill>
+                  </a:tcPr>
+                </a:tc>
+                <a:tc>
+                  <a:txBody>
+                    <a:bodyPr/>
+                    <a:lstStyle/>
+                    <a:p>
+                      <a:pPr marL="0" marR="0" algn="ctr">
+                        <a:lnSpc>
+                          <a:spcPct val="115000"/>
+                        </a:lnSpc>
+                        <a:spcBef>
+                          <a:spcPts val="0"/>
+                        </a:spcBef>
+                        <a:spcAft>
+                          <a:spcPts val="0"/>
+                        </a:spcAft>
+                      </a:pPr>
+                      <a:r>
+                        <a:rPr lang="en-US" sz="1400" dirty="0" smtClean="0">
+                          <a:latin typeface="Times New Roman" pitchFamily="18" charset="0"/>
+                          <a:ea typeface="Calibri"/>
+                          <a:cs typeface="Times New Roman"/>
+                        </a:rPr>
+                        <a:t>Limitations</a:t>
+                      </a:r>
+                      <a:r>
+                        <a:rPr lang="en-US" sz="1400" baseline="0" dirty="0" smtClean="0">
+                          <a:latin typeface="Times New Roman" pitchFamily="18" charset="0"/>
+                          <a:ea typeface="Calibri"/>
+                          <a:cs typeface="Times New Roman"/>
+                        </a:rPr>
+                        <a:t> of the paper</a:t>
+                      </a:r>
+                      <a:endParaRPr lang="en-US" sz="1400" dirty="0">
+                        <a:latin typeface="Times New Roman" pitchFamily="18" charset="0"/>
+                        <a:ea typeface="Calibri"/>
+                        <a:cs typeface="Times New Roman"/>
+                      </a:endParaRPr>
+                    </a:p>
+                  </a:txBody>
+                  <a:tcPr marL="68580" marR="68580" marT="0" marB="0">
+                    <a:solidFill>
+                      <a:schemeClr val="accent3">
+                        <a:lumMod val="40000"/>
+                        <a:lumOff val="60000"/>
+                      </a:schemeClr>
+                    </a:solidFill>
+                  </a:tcPr>
+                </a:tc>
+              </a:tr>
+              <a:tr h="1488640">
+                <a:tc>
+                  <a:txBody>
+                    <a:bodyPr/>
+                    <a:lstStyle/>
+                    <a:p>
+                      <a:r>
+                        <a:rPr lang="en-US" sz="1400" b="0" i="0" u="none" kern="1200" dirty="0" err="1" smtClean="0">
+                          <a:solidFill>
+                            <a:schemeClr val="dk1"/>
+                          </a:solidFill>
+                          <a:effectLst/>
+                          <a:latin typeface="+mn-lt"/>
+                          <a:ea typeface="+mn-ea"/>
+                          <a:cs typeface="+mn-cs"/>
+                        </a:rPr>
+                        <a:t>GoLang</a:t>
+                      </a:r>
+                      <a:r>
+                        <a:rPr lang="en-US" sz="1400" b="0" i="0" u="none" kern="1200" dirty="0" smtClean="0">
+                          <a:solidFill>
+                            <a:schemeClr val="dk1"/>
+                          </a:solidFill>
+                          <a:effectLst/>
+                          <a:latin typeface="+mn-lt"/>
+                          <a:ea typeface="+mn-ea"/>
+                          <a:cs typeface="+mn-cs"/>
+                        </a:rPr>
+                        <a:t> Conference, 2013</a:t>
+                      </a:r>
+                      <a:endParaRPr lang="en-US" sz="1400" u="none" dirty="0">
+                        <a:latin typeface="+mn-lt"/>
+                      </a:endParaRPr>
+                    </a:p>
+                  </a:txBody>
+                  <a:tcPr>
+                    <a:solidFill>
+                      <a:schemeClr val="tx2">
+                        <a:lumMod val="25000"/>
+                        <a:lumOff val="75000"/>
+                      </a:schemeClr>
+                    </a:solidFill>
+                  </a:tcPr>
+                </a:tc>
+                <a:tc>
+                  <a:txBody>
+                    <a:bodyPr/>
+                    <a:lstStyle/>
+                    <a:p>
+                      <a:pPr marL="0" marR="0" indent="0" algn="l" defTabSz="914400" rtl="0" eaLnBrk="1" fontAlgn="auto" latinLnBrk="0" hangingPunct="1">
+                        <a:lnSpc>
+                          <a:spcPct val="100000"/>
+                        </a:lnSpc>
+                        <a:spcBef>
+                          <a:spcPts val="0"/>
+                        </a:spcBef>
+                        <a:spcAft>
+                          <a:spcPts val="0"/>
+                        </a:spcAft>
+                        <a:buClrTx/>
+                        <a:buSzTx/>
+                        <a:buFontTx/>
+                        <a:buNone/>
+                        <a:tabLst/>
+                        <a:defRPr/>
+                      </a:pPr>
+                      <a:r>
+                        <a:rPr lang="en-US" sz="1400" dirty="0" err="1" smtClean="0"/>
+                        <a:t>GoHotDraw</a:t>
+                      </a:r>
+                      <a:r>
+                        <a:rPr lang="en-US" sz="1400" dirty="0" smtClean="0"/>
+                        <a:t>: Evaluating the Go Programming Language with Design Patterns</a:t>
+                      </a:r>
+                      <a:endParaRPr kumimoji="0" lang="en-US" sz="1400" kern="1200" dirty="0" smtClean="0">
+                        <a:solidFill>
+                          <a:schemeClr val="dk1"/>
+                        </a:solidFill>
+                        <a:latin typeface="+mn-lt"/>
+                        <a:ea typeface="+mn-ea"/>
+                        <a:cs typeface="+mn-cs"/>
+                      </a:endParaRPr>
+                    </a:p>
+                  </a:txBody>
+                  <a:tcPr>
+                    <a:solidFill>
+                      <a:schemeClr val="tx2">
+                        <a:lumMod val="25000"/>
+                        <a:lumOff val="75000"/>
+                      </a:schemeClr>
+                    </a:solidFill>
+                  </a:tcPr>
+                </a:tc>
+                <a:tc>
+                  <a:txBody>
+                    <a:bodyPr/>
+                    <a:lstStyle/>
+                    <a:p>
+                      <a:r>
+                        <a:rPr lang="en-US" sz="1400" b="0" i="0" u="none" strike="noStrike" kern="1200" dirty="0" smtClean="0">
+                          <a:solidFill>
+                            <a:schemeClr val="dk1"/>
+                          </a:solidFill>
+                          <a:effectLst/>
+                          <a:latin typeface="+mn-lt"/>
+                          <a:ea typeface="+mn-ea"/>
+                          <a:cs typeface="+mn-cs"/>
+                        </a:rPr>
+                        <a:t>Frank </a:t>
+                      </a:r>
+                      <a:r>
+                        <a:rPr lang="en-US" sz="1400" b="0" i="0" u="none" strike="noStrike" kern="1200" dirty="0" err="1" smtClean="0">
+                          <a:solidFill>
+                            <a:schemeClr val="dk1"/>
+                          </a:solidFill>
+                          <a:effectLst/>
+                          <a:latin typeface="+mn-lt"/>
+                          <a:ea typeface="+mn-ea"/>
+                          <a:cs typeface="+mn-cs"/>
+                        </a:rPr>
+                        <a:t>Schmager</a:t>
+                      </a:r>
+                      <a:r>
+                        <a:rPr lang="en-US" sz="1400" b="0" i="0" u="none" strike="noStrike" kern="1200" dirty="0" smtClean="0">
+                          <a:solidFill>
+                            <a:schemeClr val="dk1"/>
+                          </a:solidFill>
+                          <a:effectLst/>
+                          <a:latin typeface="+mn-lt"/>
+                          <a:ea typeface="+mn-ea"/>
+                          <a:cs typeface="+mn-cs"/>
+                        </a:rPr>
+                        <a:t>, Nicholas Cameron, James Noble</a:t>
+                      </a:r>
+                      <a:r>
+                        <a:rPr lang="en-US" sz="1400" dirty="0" smtClean="0"/>
+                        <a:t/>
+                      </a:r>
+                      <a:br>
+                        <a:rPr lang="en-US" sz="1400" dirty="0" smtClean="0"/>
+                      </a:br>
+                      <a:endParaRPr lang="en-US" sz="1400" dirty="0">
+                        <a:latin typeface="+mn-lt"/>
+                      </a:endParaRPr>
+                    </a:p>
+                  </a:txBody>
+                  <a:tcPr>
+                    <a:solidFill>
+                      <a:schemeClr val="tx2">
+                        <a:lumMod val="25000"/>
+                        <a:lumOff val="75000"/>
+                      </a:schemeClr>
+                    </a:solidFill>
+                  </a:tcPr>
+                </a:tc>
+                <a:tc>
+                  <a:txBody>
+                    <a:bodyPr/>
+                    <a:lstStyle/>
+                    <a:p>
+                      <a:r>
+                        <a:rPr kumimoji="0" lang="en-IN" sz="1400" kern="1200" dirty="0" err="1" smtClean="0">
+                          <a:solidFill>
+                            <a:schemeClr val="dk1"/>
+                          </a:solidFill>
+                          <a:latin typeface="+mn-lt"/>
+                          <a:ea typeface="+mn-ea"/>
+                          <a:cs typeface="+mn-cs"/>
+                        </a:rPr>
+                        <a:t>HotDraw</a:t>
+                      </a:r>
+                      <a:endParaRPr lang="en-US" sz="1400" dirty="0">
+                        <a:latin typeface="+mn-lt"/>
+                      </a:endParaRPr>
+                    </a:p>
+                  </a:txBody>
+                  <a:tcPr>
+                    <a:solidFill>
+                      <a:schemeClr val="tx2">
+                        <a:lumMod val="25000"/>
+                        <a:lumOff val="75000"/>
+                      </a:schemeClr>
+                    </a:solidFill>
+                  </a:tcPr>
+                </a:tc>
+                <a:tc>
+                  <a:txBody>
+                    <a:bodyPr/>
+                    <a:lstStyle/>
+                    <a:p>
+                      <a:r>
+                        <a:rPr kumimoji="0" lang="en-IN" sz="1400" kern="1200" dirty="0" smtClean="0">
+                          <a:solidFill>
+                            <a:schemeClr val="dk1"/>
+                          </a:solidFill>
+                          <a:latin typeface="+mn-lt"/>
+                          <a:ea typeface="+mn-ea"/>
+                          <a:cs typeface="+mn-cs"/>
+                        </a:rPr>
+                        <a:t>Lack of known design pattern for</a:t>
+                      </a:r>
+                      <a:r>
+                        <a:rPr kumimoji="0" lang="en-IN" sz="1400" kern="1200" baseline="0" dirty="0" smtClean="0">
+                          <a:solidFill>
+                            <a:schemeClr val="dk1"/>
+                          </a:solidFill>
+                          <a:latin typeface="+mn-lt"/>
+                          <a:ea typeface="+mn-ea"/>
+                          <a:cs typeface="+mn-cs"/>
+                        </a:rPr>
+                        <a:t> </a:t>
+                      </a:r>
+                      <a:r>
+                        <a:rPr kumimoji="0" lang="en-IN" sz="1400" kern="1200" baseline="0" dirty="0" err="1" smtClean="0">
+                          <a:solidFill>
+                            <a:schemeClr val="dk1"/>
+                          </a:solidFill>
+                          <a:latin typeface="+mn-lt"/>
+                          <a:ea typeface="+mn-ea"/>
+                          <a:cs typeface="+mn-cs"/>
+                        </a:rPr>
+                        <a:t>Golang</a:t>
+                      </a:r>
+                      <a:endParaRPr lang="en-US" sz="1400" dirty="0">
+                        <a:latin typeface="+mn-lt"/>
+                      </a:endParaRPr>
+                    </a:p>
+                  </a:txBody>
+                  <a:tcPr>
+                    <a:solidFill>
+                      <a:schemeClr val="tx2">
+                        <a:lumMod val="25000"/>
+                        <a:lumOff val="75000"/>
+                      </a:schemeClr>
+                    </a:solidFill>
+                  </a:tcPr>
+                </a:tc>
+                <a:tc>
+                  <a:txBody>
+                    <a:bodyPr/>
+                    <a:lstStyle/>
+                    <a:p>
+                      <a:r>
+                        <a:rPr lang="en-US" sz="1400" kern="150" dirty="0" smtClean="0">
+                          <a:solidFill>
+                            <a:schemeClr val="dk1"/>
+                          </a:solidFill>
+                          <a:latin typeface="+mn-lt"/>
+                          <a:ea typeface="Droid Sans Fallback"/>
+                          <a:cs typeface="FreeSans"/>
+                        </a:rPr>
+                        <a:t>Presents only 1 framework pattern</a:t>
+                      </a:r>
+                      <a:endParaRPr lang="en-US" sz="1400" kern="150" dirty="0">
+                        <a:solidFill>
+                          <a:schemeClr val="dk1"/>
+                        </a:solidFill>
+                        <a:latin typeface="+mn-lt"/>
+                        <a:ea typeface="Droid Sans Fallback"/>
+                        <a:cs typeface="FreeSans"/>
+                      </a:endParaRPr>
+                    </a:p>
+                  </a:txBody>
+                  <a:tcPr>
+                    <a:solidFill>
+                      <a:schemeClr val="tx2">
+                        <a:lumMod val="25000"/>
+                        <a:lumOff val="75000"/>
+                      </a:schemeClr>
+                    </a:solidFill>
+                  </a:tcPr>
+                </a:tc>
+              </a:tr>
+              <a:tr h="1257073">
+                <a:tc>
+                  <a:txBody>
+                    <a:bodyPr/>
+                    <a:lstStyle/>
+                    <a:p>
+                      <a:r>
+                        <a:rPr lang="en-US" sz="1400" b="0" i="0" u="none" kern="1200" dirty="0" smtClean="0">
+                          <a:solidFill>
+                            <a:schemeClr val="dk1"/>
+                          </a:solidFill>
+                          <a:effectLst/>
+                          <a:latin typeface="+mn-lt"/>
+                          <a:ea typeface="+mn-ea"/>
+                          <a:cs typeface="+mn-cs"/>
+                        </a:rPr>
+                        <a:t>Communications, Computers and Signal Processing (PACRIM), 2013 IEEE Pacific Rim Conference on, 27-29 Aug 2013</a:t>
+                      </a:r>
+                      <a:endParaRPr lang="en-US" sz="1400" b="0" i="0" u="none" strike="noStrike" kern="1200" dirty="0" smtClean="0">
+                        <a:solidFill>
+                          <a:schemeClr val="tx1"/>
+                        </a:solidFill>
+                        <a:effectLst/>
+                        <a:latin typeface="+mn-lt"/>
+                        <a:ea typeface="+mn-ea"/>
+                        <a:cs typeface="+mn-cs"/>
+                      </a:endParaRPr>
+                    </a:p>
+                  </a:txBody>
+                  <a:tcPr>
+                    <a:solidFill>
+                      <a:schemeClr val="tx2">
+                        <a:lumMod val="10000"/>
+                        <a:lumOff val="90000"/>
+                      </a:schemeClr>
+                    </a:solidFill>
+                  </a:tcPr>
+                </a:tc>
+                <a:tc>
+                  <a:txBody>
+                    <a:bodyPr/>
+                    <a:lstStyle/>
+                    <a:p>
+                      <a:r>
+                        <a:rPr lang="en-US" sz="1400" b="0" i="0" kern="1200" dirty="0" smtClean="0">
+                          <a:solidFill>
+                            <a:schemeClr val="dk1"/>
+                          </a:solidFill>
+                          <a:effectLst/>
+                          <a:latin typeface="+mn-lt"/>
+                          <a:ea typeface="+mn-ea"/>
+                          <a:cs typeface="+mn-cs"/>
+                        </a:rPr>
+                        <a:t>A security analysis of the </a:t>
+                      </a:r>
+                      <a:r>
+                        <a:rPr lang="en-US" sz="1400" b="0" i="0" kern="1200" dirty="0" err="1" smtClean="0">
+                          <a:solidFill>
+                            <a:schemeClr val="dk1"/>
+                          </a:solidFill>
+                          <a:effectLst/>
+                          <a:latin typeface="+mn-lt"/>
+                          <a:ea typeface="+mn-ea"/>
+                          <a:cs typeface="+mn-cs"/>
+                        </a:rPr>
+                        <a:t>OAuth</a:t>
+                      </a:r>
+                      <a:r>
+                        <a:rPr lang="en-US" sz="1400" b="0" i="0" kern="1200" dirty="0" smtClean="0">
+                          <a:solidFill>
+                            <a:schemeClr val="dk1"/>
+                          </a:solidFill>
+                          <a:effectLst/>
+                          <a:latin typeface="+mn-lt"/>
+                          <a:ea typeface="+mn-ea"/>
+                          <a:cs typeface="+mn-cs"/>
+                        </a:rPr>
+                        <a:t> protocol</a:t>
+                      </a:r>
+                      <a:endParaRPr lang="en-US" sz="1400" b="0" i="0" kern="1200" dirty="0">
+                        <a:solidFill>
+                          <a:schemeClr val="dk1"/>
+                        </a:solidFill>
+                        <a:effectLst/>
+                        <a:latin typeface="+mn-lt"/>
+                        <a:ea typeface="+mn-ea"/>
+                        <a:cs typeface="+mn-cs"/>
+                      </a:endParaRPr>
+                    </a:p>
+                  </a:txBody>
+                  <a:tcPr>
+                    <a:solidFill>
+                      <a:schemeClr val="tx2">
+                        <a:lumMod val="10000"/>
+                        <a:lumOff val="90000"/>
+                      </a:schemeClr>
+                    </a:solidFill>
+                  </a:tcPr>
+                </a:tc>
+                <a:tc>
+                  <a:txBody>
+                    <a:bodyPr/>
+                    <a:lstStyle/>
+                    <a:p>
+                      <a:pPr marL="0" algn="l" rtl="0" eaLnBrk="1" latinLnBrk="0" hangingPunct="1"/>
+                      <a:r>
+                        <a:rPr lang="en-US" sz="1400" b="0" i="0" u="none" strike="noStrike" kern="1200" dirty="0" smtClean="0">
+                          <a:solidFill>
+                            <a:schemeClr val="dk1"/>
+                          </a:solidFill>
+                          <a:effectLst/>
+                          <a:latin typeface="+mn-lt"/>
+                          <a:ea typeface="+mn-ea"/>
+                          <a:cs typeface="+mn-cs"/>
+                        </a:rPr>
+                        <a:t>Feng Yang, </a:t>
+                      </a:r>
+                      <a:r>
+                        <a:rPr lang="en-US" sz="1400" b="0" i="0" u="none" strike="noStrike" kern="1200" dirty="0" err="1" smtClean="0">
+                          <a:solidFill>
+                            <a:schemeClr val="dk1"/>
+                          </a:solidFill>
+                          <a:effectLst/>
+                          <a:latin typeface="+mn-lt"/>
+                          <a:ea typeface="+mn-ea"/>
+                          <a:cs typeface="+mn-cs"/>
+                        </a:rPr>
+                        <a:t>Manoharan</a:t>
+                      </a:r>
+                      <a:r>
+                        <a:rPr lang="en-US" sz="1400" b="0" i="0" u="none" strike="noStrike" kern="1200" dirty="0" smtClean="0">
+                          <a:solidFill>
+                            <a:schemeClr val="dk1"/>
+                          </a:solidFill>
+                          <a:effectLst/>
+                          <a:latin typeface="+mn-lt"/>
+                          <a:ea typeface="+mn-ea"/>
+                          <a:cs typeface="+mn-cs"/>
+                        </a:rPr>
+                        <a:t> S</a:t>
+                      </a:r>
+                      <a:endParaRPr kumimoji="0" lang="en-US" sz="1400" u="none" kern="1200" dirty="0" smtClean="0">
+                        <a:solidFill>
+                          <a:schemeClr val="dk1"/>
+                        </a:solidFill>
+                        <a:latin typeface="+mn-lt"/>
+                        <a:ea typeface="+mn-ea"/>
+                        <a:cs typeface="+mn-cs"/>
+                      </a:endParaRPr>
+                    </a:p>
+                  </a:txBody>
+                  <a:tcPr>
+                    <a:solidFill>
+                      <a:schemeClr val="tx2">
+                        <a:lumMod val="10000"/>
+                        <a:lumOff val="90000"/>
+                      </a:schemeClr>
+                    </a:solidFill>
+                  </a:tcPr>
+                </a:tc>
+                <a:tc>
+                  <a:txBody>
+                    <a:bodyPr/>
+                    <a:lstStyle/>
+                    <a:p>
+                      <a:r>
+                        <a:rPr kumimoji="0" lang="en-IN" sz="1400" kern="1200" dirty="0" smtClean="0">
+                          <a:solidFill>
+                            <a:schemeClr val="dk1"/>
+                          </a:solidFill>
+                          <a:latin typeface="+mn-lt"/>
+                          <a:ea typeface="+mn-ea"/>
+                          <a:cs typeface="+mn-cs"/>
+                        </a:rPr>
+                        <a:t>Attacker model to study security</a:t>
+                      </a:r>
+                      <a:r>
+                        <a:rPr kumimoji="0" lang="en-IN" sz="1400" kern="1200" baseline="0" dirty="0" smtClean="0">
+                          <a:solidFill>
+                            <a:schemeClr val="dk1"/>
+                          </a:solidFill>
+                          <a:latin typeface="+mn-lt"/>
+                          <a:ea typeface="+mn-ea"/>
+                          <a:cs typeface="+mn-cs"/>
+                        </a:rPr>
+                        <a:t> vulnerabilities</a:t>
+                      </a:r>
+                      <a:endParaRPr kumimoji="0" lang="en-US" sz="1400" kern="1200" dirty="0">
+                        <a:solidFill>
+                          <a:schemeClr val="dk1"/>
+                        </a:solidFill>
+                        <a:latin typeface="+mn-lt"/>
+                        <a:ea typeface="+mn-ea"/>
+                        <a:cs typeface="+mn-cs"/>
+                      </a:endParaRPr>
+                    </a:p>
+                  </a:txBody>
+                  <a:tcPr>
+                    <a:solidFill>
+                      <a:schemeClr val="tx2">
+                        <a:lumMod val="10000"/>
+                        <a:lumOff val="90000"/>
+                      </a:schemeClr>
+                    </a:solidFill>
+                  </a:tcPr>
+                </a:tc>
+                <a:tc>
+                  <a:txBody>
+                    <a:bodyPr/>
+                    <a:lstStyle/>
+                    <a:p>
+                      <a:r>
+                        <a:rPr kumimoji="0" lang="en-IN" sz="1400" kern="1200" dirty="0" smtClean="0">
+                          <a:solidFill>
+                            <a:schemeClr val="dk1"/>
+                          </a:solidFill>
+                          <a:latin typeface="+mn-lt"/>
+                          <a:ea typeface="+mn-ea"/>
+                          <a:cs typeface="+mn-cs"/>
+                        </a:rPr>
+                        <a:t>Tackling abuse of authorization code</a:t>
+                      </a:r>
+                      <a:endParaRPr lang="en-US" sz="1400" dirty="0">
+                        <a:latin typeface="+mn-lt"/>
+                      </a:endParaRPr>
+                    </a:p>
+                  </a:txBody>
+                  <a:tcPr marL="34925" marR="34925" marT="34925" marB="34925">
+                    <a:solidFill>
+                      <a:schemeClr val="tx2">
+                        <a:lumMod val="10000"/>
+                        <a:lumOff val="90000"/>
+                      </a:schemeClr>
+                    </a:solidFill>
+                  </a:tcPr>
+                </a:tc>
+                <a:tc>
+                  <a:txBody>
+                    <a:bodyPr/>
+                    <a:lstStyle/>
+                    <a:p>
+                      <a:pPr marL="0" marR="0">
+                        <a:spcBef>
+                          <a:spcPts val="0"/>
+                        </a:spcBef>
+                        <a:spcAft>
+                          <a:spcPts val="0"/>
+                        </a:spcAft>
+                      </a:pPr>
+                      <a:r>
+                        <a:rPr lang="en-US" sz="1400" kern="150" dirty="0" smtClean="0">
+                          <a:latin typeface="+mn-lt"/>
+                          <a:ea typeface="Droid Sans Fallback"/>
+                          <a:cs typeface="FreeSans"/>
+                        </a:rPr>
+                        <a:t>Does not present a viable solution</a:t>
+                      </a:r>
+                      <a:endParaRPr lang="en-US" sz="1400" kern="150" dirty="0">
+                        <a:latin typeface="+mn-lt"/>
+                        <a:ea typeface="Droid Sans Fallback"/>
+                        <a:cs typeface="FreeSans"/>
+                      </a:endParaRPr>
+                    </a:p>
+                  </a:txBody>
+                  <a:tcPr marL="34925" marR="34925" marT="34925" marB="34925">
+                    <a:solidFill>
+                      <a:schemeClr val="tx2">
+                        <a:lumMod val="10000"/>
+                        <a:lumOff val="90000"/>
+                      </a:schemeClr>
+                    </a:solidFill>
+                  </a:tcPr>
+                </a:tc>
+              </a:tr>
+            </a:tbl>
+          </a:graphicData>
+        </a:graphic>
+      </p:graphicFrame>
+      <p:sp>
+        <p:nvSpPr>
+          <p:cNvPr id="5" name="Title 1"/>
+          <p:cNvSpPr txBox="1">
+            <a:spLocks/>
+          </p:cNvSpPr>
+          <p:nvPr/>
+        </p:nvSpPr>
+        <p:spPr>
+          <a:xfrm>
+            <a:off x="457200" y="304800"/>
+            <a:ext cx="8534400" cy="758952"/>
+          </a:xfrm>
+          <a:prstGeom prst="rect">
+            <a:avLst/>
+          </a:prstGeom>
+        </p:spPr>
+        <p:txBody>
+          <a:bodyPr vert="horz" lIns="91440" tIns="45720" rIns="91440" bIns="45720" rtlCol="0" anchor="ctr">
+            <a:normAutofit lnSpcReduction="10000"/>
+          </a:bodyPr>
+          <a:lstStyle>
+            <a:lvl1pPr algn="ctr" defTabSz="914400" rtl="0" eaLnBrk="1" latinLnBrk="0" hangingPunct="1">
+              <a:spcBef>
+                <a:spcPct val="0"/>
+              </a:spcBef>
+              <a:buNone/>
+              <a:defRPr sz="4400" kern="1200">
+                <a:solidFill>
+                  <a:schemeClr val="tx1"/>
+                </a:solidFill>
+                <a:latin typeface="+mj-lt"/>
+                <a:ea typeface="+mj-ea"/>
+                <a:cs typeface="+mj-cs"/>
+              </a:defRPr>
+            </a:lvl1pPr>
+          </a:lstStyle>
+          <a:p>
+            <a:pPr algn="l"/>
             <a:r>
               <a:rPr lang="en-US" dirty="0" smtClean="0"/>
-              <a:t>Survey</a:t>
+              <a:t>Literature Survey</a:t>
             </a:r>
             <a:endParaRPr lang="en-US" dirty="0"/>
+          </a:p>
+        </p:txBody>
+      </p:sp>
+      <p:sp>
+        <p:nvSpPr>
+          <p:cNvPr id="2" name="Slide Number Placeholder 1"/>
+          <p:cNvSpPr>
+            <a:spLocks noGrp="1"/>
+          </p:cNvSpPr>
+          <p:nvPr>
+            <p:ph type="sldNum" sz="quarter" idx="12"/>
+          </p:nvPr>
+        </p:nvSpPr>
+        <p:spPr/>
+        <p:txBody>
+          <a:bodyPr/>
+          <a:lstStyle/>
+          <a:p>
+            <a:fld id="{3E144E38-9B7E-4F9B-8E28-ACBFB64687FB}" type="slidenum">
+              <a:rPr lang="en-US" smtClean="0"/>
+              <a:t>3</a:t>
+            </a:fld>
+            <a:endParaRPr lang="en-US"/>
           </a:p>
         </p:txBody>
       </p:sp>
@@ -4965,6 +6396,1166 @@
     <p:extLst>
       <p:ext uri="{BB962C8B-B14F-4D97-AF65-F5344CB8AC3E}">
         <p14:creationId xmlns:p14="http://schemas.microsoft.com/office/powerpoint/2010/main" val="136495343"/>
+      </p:ext>
+    </p:extLst>
+  </p:cSld>
+  <p:clrMapOvr>
+    <a:masterClrMapping/>
+  </p:clrMapOvr>
+</p:sld>
+</file>
+
+<file path=ppt/slides/slide4.xml><?xml version="1.0" encoding="utf-8"?>
+<p:sld xmlns:a="http://schemas.openxmlformats.org/drawingml/2006/main" xmlns:r="http://schemas.openxmlformats.org/officeDocument/2006/relationships" xmlns:p="http://schemas.openxmlformats.org/presentationml/2006/main">
+  <p:cSld>
+    <p:spTree>
+      <p:nvGrpSpPr>
+        <p:cNvPr id="1" name=""/>
+        <p:cNvGrpSpPr/>
+        <p:nvPr/>
+      </p:nvGrpSpPr>
+      <p:grpSpPr>
+        <a:xfrm>
+          <a:off x="0" y="0"/>
+          <a:ext cx="0" cy="0"/>
+          <a:chOff x="0" y="0"/>
+          <a:chExt cx="0" cy="0"/>
+        </a:xfrm>
+      </p:grpSpPr>
+      <p:graphicFrame>
+        <p:nvGraphicFramePr>
+          <p:cNvPr id="4" name="Table 3"/>
+          <p:cNvGraphicFramePr>
+            <a:graphicFrameLocks noGrp="1"/>
+          </p:cNvGraphicFramePr>
+          <p:nvPr>
+            <p:extLst>
+              <p:ext uri="{D42A27DB-BD31-4B8C-83A1-F6EECF244321}">
+                <p14:modId xmlns:p14="http://schemas.microsoft.com/office/powerpoint/2010/main" val="256804978"/>
+              </p:ext>
+            </p:extLst>
+          </p:nvPr>
+        </p:nvGraphicFramePr>
+        <p:xfrm>
+          <a:off x="434788" y="1177245"/>
+          <a:ext cx="8305801" cy="4151376"/>
+        </p:xfrm>
+        <a:graphic>
+          <a:graphicData uri="http://schemas.openxmlformats.org/drawingml/2006/table">
+            <a:tbl>
+              <a:tblPr firstRow="1" bandRow="1">
+                <a:tableStyleId>{5C22544A-7EE6-4342-B048-85BDC9FD1C3A}</a:tableStyleId>
+              </a:tblPr>
+              <a:tblGrid>
+                <a:gridCol w="1384300"/>
+                <a:gridCol w="1381312"/>
+                <a:gridCol w="1387288"/>
+                <a:gridCol w="1131059"/>
+                <a:gridCol w="1414017"/>
+                <a:gridCol w="1607825"/>
+              </a:tblGrid>
+              <a:tr h="950214">
+                <a:tc>
+                  <a:txBody>
+                    <a:bodyPr/>
+                    <a:lstStyle/>
+                    <a:p>
+                      <a:pPr marL="0" marR="0" algn="ctr">
+                        <a:lnSpc>
+                          <a:spcPct val="115000"/>
+                        </a:lnSpc>
+                        <a:spcBef>
+                          <a:spcPts val="0"/>
+                        </a:spcBef>
+                        <a:spcAft>
+                          <a:spcPts val="0"/>
+                        </a:spcAft>
+                      </a:pPr>
+                      <a:r>
+                        <a:rPr lang="en-US" sz="1400" dirty="0" smtClean="0">
+                          <a:latin typeface="Times New Roman" pitchFamily="18" charset="0"/>
+                          <a:ea typeface="Calibri"/>
+                          <a:cs typeface="Times New Roman"/>
+                        </a:rPr>
+                        <a:t>Year,</a:t>
+                      </a:r>
+                      <a:r>
+                        <a:rPr lang="en-US" sz="1400" baseline="0" dirty="0" smtClean="0">
+                          <a:latin typeface="Times New Roman" pitchFamily="18" charset="0"/>
+                          <a:ea typeface="Calibri"/>
+                          <a:cs typeface="Times New Roman"/>
+                        </a:rPr>
+                        <a:t> Name  of the Journal/Conference </a:t>
+                      </a:r>
+                      <a:endParaRPr lang="en-US" sz="1400" dirty="0">
+                        <a:latin typeface="Times New Roman" pitchFamily="18" charset="0"/>
+                        <a:ea typeface="Calibri"/>
+                        <a:cs typeface="Times New Roman"/>
+                      </a:endParaRPr>
+                    </a:p>
+                  </a:txBody>
+                  <a:tcPr marL="68580" marR="68580" marT="0" marB="0">
+                    <a:solidFill>
+                      <a:schemeClr val="accent3">
+                        <a:lumMod val="40000"/>
+                        <a:lumOff val="60000"/>
+                      </a:schemeClr>
+                    </a:solidFill>
+                  </a:tcPr>
+                </a:tc>
+                <a:tc>
+                  <a:txBody>
+                    <a:bodyPr/>
+                    <a:lstStyle/>
+                    <a:p>
+                      <a:pPr marL="0" marR="0" algn="ctr">
+                        <a:lnSpc>
+                          <a:spcPct val="115000"/>
+                        </a:lnSpc>
+                        <a:spcBef>
+                          <a:spcPts val="0"/>
+                        </a:spcBef>
+                        <a:spcAft>
+                          <a:spcPts val="0"/>
+                        </a:spcAft>
+                      </a:pPr>
+                      <a:r>
+                        <a:rPr lang="en-US" sz="1400" dirty="0" smtClean="0">
+                          <a:latin typeface="Times New Roman" pitchFamily="18" charset="0"/>
+                          <a:ea typeface="Calibri"/>
+                          <a:cs typeface="Times New Roman"/>
+                        </a:rPr>
+                        <a:t>Title of the paper</a:t>
+                      </a:r>
+                      <a:endParaRPr lang="en-US" sz="1400" dirty="0">
+                        <a:latin typeface="Times New Roman" pitchFamily="18" charset="0"/>
+                        <a:ea typeface="Calibri"/>
+                        <a:cs typeface="Times New Roman"/>
+                      </a:endParaRPr>
+                    </a:p>
+                  </a:txBody>
+                  <a:tcPr marL="68580" marR="68580" marT="0" marB="0">
+                    <a:solidFill>
+                      <a:schemeClr val="accent3">
+                        <a:lumMod val="40000"/>
+                        <a:lumOff val="60000"/>
+                      </a:schemeClr>
+                    </a:solidFill>
+                  </a:tcPr>
+                </a:tc>
+                <a:tc>
+                  <a:txBody>
+                    <a:bodyPr/>
+                    <a:lstStyle/>
+                    <a:p>
+                      <a:pPr marL="0" marR="0" algn="ctr">
+                        <a:lnSpc>
+                          <a:spcPct val="115000"/>
+                        </a:lnSpc>
+                        <a:spcBef>
+                          <a:spcPts val="0"/>
+                        </a:spcBef>
+                        <a:spcAft>
+                          <a:spcPts val="0"/>
+                        </a:spcAft>
+                      </a:pPr>
+                      <a:r>
+                        <a:rPr lang="en-US" sz="1400" dirty="0" smtClean="0">
+                          <a:latin typeface="Times New Roman" pitchFamily="18" charset="0"/>
+                          <a:ea typeface="Calibri"/>
+                          <a:cs typeface="Times New Roman"/>
+                        </a:rPr>
+                        <a:t>Authors of the paper</a:t>
+                      </a:r>
+                      <a:endParaRPr lang="en-US" sz="1400" dirty="0">
+                        <a:latin typeface="Times New Roman" pitchFamily="18" charset="0"/>
+                        <a:ea typeface="Calibri"/>
+                        <a:cs typeface="Times New Roman"/>
+                      </a:endParaRPr>
+                    </a:p>
+                  </a:txBody>
+                  <a:tcPr marL="68580" marR="68580" marT="0" marB="0">
+                    <a:solidFill>
+                      <a:schemeClr val="accent3">
+                        <a:lumMod val="40000"/>
+                        <a:lumOff val="60000"/>
+                      </a:schemeClr>
+                    </a:solidFill>
+                  </a:tcPr>
+                </a:tc>
+                <a:tc>
+                  <a:txBody>
+                    <a:bodyPr/>
+                    <a:lstStyle/>
+                    <a:p>
+                      <a:pPr marL="342900" marR="0" lvl="0" indent="-342900" algn="ctr">
+                        <a:lnSpc>
+                          <a:spcPct val="115000"/>
+                        </a:lnSpc>
+                        <a:spcBef>
+                          <a:spcPts val="0"/>
+                        </a:spcBef>
+                        <a:spcAft>
+                          <a:spcPts val="0"/>
+                        </a:spcAft>
+                        <a:buFont typeface="Wingdings"/>
+                        <a:buNone/>
+                      </a:pPr>
+                      <a:r>
+                        <a:rPr lang="en-US" sz="1400" dirty="0" smtClean="0">
+                          <a:latin typeface="Times New Roman" pitchFamily="18" charset="0"/>
+                          <a:ea typeface="Calibri"/>
+                          <a:cs typeface="Times New Roman"/>
+                        </a:rPr>
+                        <a:t>Model/Sub</a:t>
+                      </a:r>
+                      <a:r>
+                        <a:rPr lang="en-US" sz="1400" baseline="0" dirty="0" smtClean="0">
+                          <a:latin typeface="Times New Roman" pitchFamily="18" charset="0"/>
+                          <a:ea typeface="Calibri"/>
+                          <a:cs typeface="Times New Roman"/>
+                        </a:rPr>
+                        <a:t> Model used</a:t>
+                      </a:r>
+                      <a:endParaRPr lang="en-US" sz="1400" dirty="0">
+                        <a:latin typeface="Times New Roman" pitchFamily="18" charset="0"/>
+                        <a:ea typeface="Calibri"/>
+                        <a:cs typeface="Times New Roman"/>
+                      </a:endParaRPr>
+                    </a:p>
+                  </a:txBody>
+                  <a:tcPr marL="68580" marR="68580" marT="0" marB="0">
+                    <a:solidFill>
+                      <a:schemeClr val="accent3">
+                        <a:lumMod val="40000"/>
+                        <a:lumOff val="60000"/>
+                      </a:schemeClr>
+                    </a:solidFill>
+                  </a:tcPr>
+                </a:tc>
+                <a:tc>
+                  <a:txBody>
+                    <a:bodyPr/>
+                    <a:lstStyle/>
+                    <a:p>
+                      <a:pPr marL="342900" marR="0" lvl="0" indent="-342900" algn="ctr">
+                        <a:lnSpc>
+                          <a:spcPct val="115000"/>
+                        </a:lnSpc>
+                        <a:spcBef>
+                          <a:spcPts val="0"/>
+                        </a:spcBef>
+                        <a:spcAft>
+                          <a:spcPts val="0"/>
+                        </a:spcAft>
+                        <a:buFont typeface="Wingdings"/>
+                        <a:buNone/>
+                      </a:pPr>
+                      <a:r>
+                        <a:rPr lang="en-US" sz="1400" dirty="0" smtClean="0">
+                          <a:latin typeface="Times New Roman" pitchFamily="18" charset="0"/>
+                          <a:ea typeface="Calibri"/>
+                          <a:cs typeface="Times New Roman"/>
+                        </a:rPr>
+                        <a:t>Challenges of the paper</a:t>
+                      </a:r>
+                      <a:endParaRPr lang="en-US" sz="1400" dirty="0">
+                        <a:latin typeface="Times New Roman" pitchFamily="18" charset="0"/>
+                        <a:ea typeface="Calibri"/>
+                        <a:cs typeface="Times New Roman"/>
+                      </a:endParaRPr>
+                    </a:p>
+                  </a:txBody>
+                  <a:tcPr marL="68580" marR="68580" marT="0" marB="0">
+                    <a:solidFill>
+                      <a:schemeClr val="accent3">
+                        <a:lumMod val="40000"/>
+                        <a:lumOff val="60000"/>
+                      </a:schemeClr>
+                    </a:solidFill>
+                  </a:tcPr>
+                </a:tc>
+                <a:tc>
+                  <a:txBody>
+                    <a:bodyPr/>
+                    <a:lstStyle/>
+                    <a:p>
+                      <a:pPr marL="0" marR="0" algn="ctr">
+                        <a:lnSpc>
+                          <a:spcPct val="115000"/>
+                        </a:lnSpc>
+                        <a:spcBef>
+                          <a:spcPts val="0"/>
+                        </a:spcBef>
+                        <a:spcAft>
+                          <a:spcPts val="0"/>
+                        </a:spcAft>
+                      </a:pPr>
+                      <a:r>
+                        <a:rPr lang="en-US" sz="1400" dirty="0" smtClean="0">
+                          <a:latin typeface="Times New Roman" pitchFamily="18" charset="0"/>
+                          <a:ea typeface="Calibri"/>
+                          <a:cs typeface="Times New Roman"/>
+                        </a:rPr>
+                        <a:t>Limitations</a:t>
+                      </a:r>
+                      <a:r>
+                        <a:rPr lang="en-US" sz="1400" baseline="0" dirty="0" smtClean="0">
+                          <a:latin typeface="Times New Roman" pitchFamily="18" charset="0"/>
+                          <a:ea typeface="Calibri"/>
+                          <a:cs typeface="Times New Roman"/>
+                        </a:rPr>
+                        <a:t> of the paper</a:t>
+                      </a:r>
+                      <a:endParaRPr lang="en-US" sz="1400" dirty="0">
+                        <a:latin typeface="Times New Roman" pitchFamily="18" charset="0"/>
+                        <a:ea typeface="Calibri"/>
+                        <a:cs typeface="Times New Roman"/>
+                      </a:endParaRPr>
+                    </a:p>
+                  </a:txBody>
+                  <a:tcPr marL="68580" marR="68580" marT="0" marB="0">
+                    <a:solidFill>
+                      <a:schemeClr val="accent3">
+                        <a:lumMod val="40000"/>
+                        <a:lumOff val="60000"/>
+                      </a:schemeClr>
+                    </a:solidFill>
+                  </a:tcPr>
+                </a:tc>
+              </a:tr>
+              <a:tr h="1488640">
+                <a:tc>
+                  <a:txBody>
+                    <a:bodyPr/>
+                    <a:lstStyle/>
+                    <a:p>
+                      <a:r>
+                        <a:rPr lang="en-US" sz="1400" b="0" i="0" kern="1200" dirty="0" smtClean="0">
+                          <a:solidFill>
+                            <a:schemeClr val="dk1"/>
+                          </a:solidFill>
+                          <a:effectLst/>
+                          <a:latin typeface="+mn-lt"/>
+                          <a:ea typeface="+mn-ea"/>
+                          <a:cs typeface="+mn-cs"/>
+                        </a:rPr>
+                        <a:t>2011 International Conference on Communication Systems and Network Technologies</a:t>
+                      </a:r>
+                      <a:endParaRPr lang="en-US" sz="1400" u="none" dirty="0">
+                        <a:latin typeface="+mn-lt"/>
+                      </a:endParaRPr>
+                    </a:p>
+                  </a:txBody>
+                  <a:tcPr>
+                    <a:solidFill>
+                      <a:schemeClr val="tx2">
+                        <a:lumMod val="25000"/>
+                        <a:lumOff val="75000"/>
+                      </a:schemeClr>
+                    </a:solidFill>
+                  </a:tcPr>
+                </a:tc>
+                <a:tc>
+                  <a:txBody>
+                    <a:bodyPr/>
+                    <a:lstStyle/>
+                    <a:p>
+                      <a:pPr marL="0" marR="0" indent="0" algn="l" defTabSz="914400" rtl="0" eaLnBrk="1" fontAlgn="auto" latinLnBrk="0" hangingPunct="1">
+                        <a:lnSpc>
+                          <a:spcPct val="100000"/>
+                        </a:lnSpc>
+                        <a:spcBef>
+                          <a:spcPts val="0"/>
+                        </a:spcBef>
+                        <a:spcAft>
+                          <a:spcPts val="0"/>
+                        </a:spcAft>
+                        <a:buClrTx/>
+                        <a:buSzTx/>
+                        <a:buFontTx/>
+                        <a:buNone/>
+                        <a:tabLst/>
+                        <a:defRPr/>
+                      </a:pPr>
+                      <a:r>
+                        <a:rPr lang="en-US" sz="1400" b="0" i="0" kern="1200" dirty="0" smtClean="0">
+                          <a:solidFill>
+                            <a:schemeClr val="dk1"/>
+                          </a:solidFill>
+                          <a:effectLst/>
+                          <a:latin typeface="+mn-lt"/>
+                          <a:ea typeface="+mn-ea"/>
+                          <a:cs typeface="+mn-cs"/>
+                        </a:rPr>
+                        <a:t>Formal Veriﬁcation of </a:t>
+                      </a:r>
+                      <a:r>
+                        <a:rPr lang="en-US" sz="1400" b="0" i="0" kern="1200" dirty="0" err="1" smtClean="0">
+                          <a:solidFill>
+                            <a:schemeClr val="dk1"/>
+                          </a:solidFill>
+                          <a:effectLst/>
+                          <a:latin typeface="+mn-lt"/>
+                          <a:ea typeface="+mn-ea"/>
+                          <a:cs typeface="+mn-cs"/>
+                        </a:rPr>
+                        <a:t>OAuth</a:t>
+                      </a:r>
+                      <a:r>
+                        <a:rPr lang="en-US" sz="1400" b="0" i="0" kern="1200" dirty="0" smtClean="0">
+                          <a:solidFill>
+                            <a:schemeClr val="dk1"/>
+                          </a:solidFill>
+                          <a:effectLst/>
+                          <a:latin typeface="+mn-lt"/>
+                          <a:ea typeface="+mn-ea"/>
+                          <a:cs typeface="+mn-cs"/>
+                        </a:rPr>
+                        <a:t> 2.0 using </a:t>
+                      </a:r>
+                      <a:r>
+                        <a:rPr lang="en-US" sz="1400" b="0" i="0" kern="1200" dirty="0" err="1" smtClean="0">
+                          <a:solidFill>
+                            <a:schemeClr val="dk1"/>
+                          </a:solidFill>
+                          <a:effectLst/>
+                          <a:latin typeface="+mn-lt"/>
+                          <a:ea typeface="+mn-ea"/>
+                          <a:cs typeface="+mn-cs"/>
+                        </a:rPr>
+                        <a:t>AlloyFramework</a:t>
+                      </a:r>
+                      <a:endParaRPr kumimoji="0" lang="en-US" sz="1400" kern="1200" dirty="0" smtClean="0">
+                        <a:solidFill>
+                          <a:schemeClr val="dk1"/>
+                        </a:solidFill>
+                        <a:latin typeface="+mn-lt"/>
+                        <a:ea typeface="+mn-ea"/>
+                        <a:cs typeface="+mn-cs"/>
+                      </a:endParaRPr>
+                    </a:p>
+                  </a:txBody>
+                  <a:tcPr>
+                    <a:solidFill>
+                      <a:schemeClr val="tx2">
+                        <a:lumMod val="25000"/>
+                        <a:lumOff val="75000"/>
+                      </a:schemeClr>
+                    </a:solidFill>
+                  </a:tcPr>
+                </a:tc>
+                <a:tc>
+                  <a:txBody>
+                    <a:bodyPr/>
+                    <a:lstStyle/>
+                    <a:p>
+                      <a:r>
+                        <a:rPr lang="en-US" sz="1400" b="0" i="0" kern="1200" dirty="0" err="1" smtClean="0">
+                          <a:solidFill>
+                            <a:schemeClr val="dk1"/>
+                          </a:solidFill>
+                          <a:effectLst/>
+                          <a:latin typeface="+mn-lt"/>
+                          <a:ea typeface="+mn-ea"/>
+                          <a:cs typeface="+mn-cs"/>
+                        </a:rPr>
+                        <a:t>Suhas</a:t>
+                      </a:r>
+                      <a:r>
+                        <a:rPr lang="en-US" sz="1400" b="0" i="0" kern="1200" dirty="0" smtClean="0">
+                          <a:solidFill>
+                            <a:schemeClr val="dk1"/>
+                          </a:solidFill>
+                          <a:effectLst/>
+                          <a:latin typeface="+mn-lt"/>
+                          <a:ea typeface="+mn-ea"/>
+                          <a:cs typeface="+mn-cs"/>
+                        </a:rPr>
+                        <a:t> </a:t>
+                      </a:r>
+                      <a:r>
+                        <a:rPr lang="en-US" sz="1400" b="0" i="0" kern="1200" dirty="0" err="1" smtClean="0">
+                          <a:solidFill>
+                            <a:schemeClr val="dk1"/>
+                          </a:solidFill>
+                          <a:effectLst/>
+                          <a:latin typeface="+mn-lt"/>
+                          <a:ea typeface="+mn-ea"/>
+                          <a:cs typeface="+mn-cs"/>
+                        </a:rPr>
+                        <a:t>Pai</a:t>
+                      </a:r>
+                      <a:r>
+                        <a:rPr lang="en-US" sz="1400" b="0" i="0" kern="1200" dirty="0" smtClean="0">
+                          <a:solidFill>
+                            <a:schemeClr val="dk1"/>
+                          </a:solidFill>
+                          <a:effectLst/>
+                          <a:latin typeface="+mn-lt"/>
+                          <a:ea typeface="+mn-ea"/>
+                          <a:cs typeface="+mn-cs"/>
+                        </a:rPr>
+                        <a:t>, </a:t>
+                      </a:r>
+                      <a:r>
+                        <a:rPr lang="en-US" sz="1400" b="0" i="0" kern="1200" dirty="0" err="1" smtClean="0">
+                          <a:solidFill>
+                            <a:schemeClr val="dk1"/>
+                          </a:solidFill>
+                          <a:effectLst/>
+                          <a:latin typeface="+mn-lt"/>
+                          <a:ea typeface="+mn-ea"/>
+                          <a:cs typeface="+mn-cs"/>
+                        </a:rPr>
+                        <a:t>Yash</a:t>
+                      </a:r>
+                      <a:r>
+                        <a:rPr lang="en-US" sz="1400" b="0" i="0" kern="1200" dirty="0" smtClean="0">
+                          <a:solidFill>
+                            <a:schemeClr val="dk1"/>
+                          </a:solidFill>
+                          <a:effectLst/>
+                          <a:latin typeface="+mn-lt"/>
+                          <a:ea typeface="+mn-ea"/>
+                          <a:cs typeface="+mn-cs"/>
+                        </a:rPr>
+                        <a:t> Sharma, Sunil Kumar, </a:t>
+                      </a:r>
+                      <a:r>
+                        <a:rPr lang="en-US" sz="1400" b="0" i="0" kern="1200" dirty="0" err="1" smtClean="0">
+                          <a:solidFill>
+                            <a:schemeClr val="dk1"/>
+                          </a:solidFill>
+                          <a:effectLst/>
+                          <a:latin typeface="+mn-lt"/>
+                          <a:ea typeface="+mn-ea"/>
+                          <a:cs typeface="+mn-cs"/>
+                        </a:rPr>
+                        <a:t>Radhika</a:t>
+                      </a:r>
+                      <a:r>
+                        <a:rPr lang="en-US" sz="1400" b="0" i="0" kern="1200" dirty="0" smtClean="0">
+                          <a:solidFill>
+                            <a:schemeClr val="dk1"/>
+                          </a:solidFill>
+                          <a:effectLst/>
+                          <a:latin typeface="+mn-lt"/>
+                          <a:ea typeface="+mn-ea"/>
+                          <a:cs typeface="+mn-cs"/>
+                        </a:rPr>
+                        <a:t> M </a:t>
+                      </a:r>
+                      <a:r>
+                        <a:rPr lang="en-US" sz="1400" b="0" i="0" kern="1200" dirty="0" err="1" smtClean="0">
+                          <a:solidFill>
+                            <a:schemeClr val="dk1"/>
+                          </a:solidFill>
+                          <a:effectLst/>
+                          <a:latin typeface="+mn-lt"/>
+                          <a:ea typeface="+mn-ea"/>
+                          <a:cs typeface="+mn-cs"/>
+                        </a:rPr>
+                        <a:t>Pai</a:t>
+                      </a:r>
+                      <a:r>
+                        <a:rPr lang="en-US" sz="1400" b="0" i="0" kern="1200" dirty="0" smtClean="0">
+                          <a:solidFill>
+                            <a:schemeClr val="dk1"/>
+                          </a:solidFill>
+                          <a:effectLst/>
+                          <a:latin typeface="+mn-lt"/>
+                          <a:ea typeface="+mn-ea"/>
+                          <a:cs typeface="+mn-cs"/>
+                        </a:rPr>
+                        <a:t> and Sanjay Singh</a:t>
+                      </a:r>
+                      <a:r>
+                        <a:rPr lang="en-US" sz="1400" dirty="0" smtClean="0"/>
+                        <a:t/>
+                      </a:r>
+                      <a:br>
+                        <a:rPr lang="en-US" sz="1400" dirty="0" smtClean="0"/>
+                      </a:br>
+                      <a:endParaRPr lang="en-US" sz="1400" dirty="0">
+                        <a:latin typeface="+mn-lt"/>
+                      </a:endParaRPr>
+                    </a:p>
+                  </a:txBody>
+                  <a:tcPr>
+                    <a:solidFill>
+                      <a:schemeClr val="tx2">
+                        <a:lumMod val="25000"/>
+                        <a:lumOff val="75000"/>
+                      </a:schemeClr>
+                    </a:solidFill>
+                  </a:tcPr>
+                </a:tc>
+                <a:tc>
+                  <a:txBody>
+                    <a:bodyPr/>
+                    <a:lstStyle/>
+                    <a:p>
+                      <a:r>
+                        <a:rPr kumimoji="0" lang="en-IN" sz="1400" kern="1200" dirty="0" smtClean="0">
+                          <a:solidFill>
+                            <a:schemeClr val="dk1"/>
+                          </a:solidFill>
+                          <a:latin typeface="+mn-lt"/>
+                          <a:ea typeface="+mn-ea"/>
+                          <a:cs typeface="+mn-cs"/>
+                        </a:rPr>
+                        <a:t>Alloy modelling language for specification and Alloy </a:t>
+                      </a:r>
+                      <a:r>
+                        <a:rPr kumimoji="0" lang="en-IN" sz="1400" kern="1200" dirty="0" err="1" smtClean="0">
+                          <a:solidFill>
+                            <a:schemeClr val="dk1"/>
+                          </a:solidFill>
+                          <a:latin typeface="+mn-lt"/>
+                          <a:ea typeface="+mn-ea"/>
+                          <a:cs typeface="+mn-cs"/>
+                        </a:rPr>
+                        <a:t>analyzer</a:t>
+                      </a:r>
+                      <a:r>
+                        <a:rPr kumimoji="0" lang="en-IN" sz="1400" kern="1200" baseline="0" dirty="0" smtClean="0">
+                          <a:solidFill>
+                            <a:schemeClr val="dk1"/>
+                          </a:solidFill>
+                          <a:latin typeface="+mn-lt"/>
+                          <a:ea typeface="+mn-ea"/>
+                          <a:cs typeface="+mn-cs"/>
+                        </a:rPr>
+                        <a:t> for verification</a:t>
+                      </a:r>
+                      <a:endParaRPr lang="en-US" sz="1400" dirty="0">
+                        <a:latin typeface="+mn-lt"/>
+                      </a:endParaRPr>
+                    </a:p>
+                  </a:txBody>
+                  <a:tcPr>
+                    <a:solidFill>
+                      <a:schemeClr val="tx2">
+                        <a:lumMod val="25000"/>
+                        <a:lumOff val="75000"/>
+                      </a:schemeClr>
+                    </a:solidFill>
+                  </a:tcPr>
+                </a:tc>
+                <a:tc>
+                  <a:txBody>
+                    <a:bodyPr/>
+                    <a:lstStyle/>
+                    <a:p>
+                      <a:r>
+                        <a:rPr kumimoji="0" lang="en-IN" sz="1400" kern="1200" dirty="0" smtClean="0">
+                          <a:solidFill>
+                            <a:schemeClr val="dk1"/>
+                          </a:solidFill>
+                          <a:latin typeface="+mn-lt"/>
+                          <a:ea typeface="+mn-ea"/>
+                          <a:cs typeface="+mn-cs"/>
+                        </a:rPr>
+                        <a:t>Evaluation of correctness of OAuth2 protocol </a:t>
+                      </a:r>
+                      <a:endParaRPr lang="en-US" sz="1400" dirty="0">
+                        <a:latin typeface="+mn-lt"/>
+                      </a:endParaRPr>
+                    </a:p>
+                  </a:txBody>
+                  <a:tcPr>
+                    <a:solidFill>
+                      <a:schemeClr val="tx2">
+                        <a:lumMod val="25000"/>
+                        <a:lumOff val="75000"/>
+                      </a:schemeClr>
+                    </a:solidFill>
+                  </a:tcPr>
+                </a:tc>
+                <a:tc>
+                  <a:txBody>
+                    <a:bodyPr/>
+                    <a:lstStyle/>
+                    <a:p>
+                      <a:r>
+                        <a:rPr lang="en-US" sz="1400" kern="150" dirty="0" smtClean="0">
+                          <a:solidFill>
+                            <a:schemeClr val="dk1"/>
+                          </a:solidFill>
+                          <a:latin typeface="+mn-lt"/>
+                          <a:ea typeface="Droid Sans Fallback"/>
+                          <a:cs typeface="FreeSans"/>
+                        </a:rPr>
+                        <a:t>Only identifies known security vulnerabilities</a:t>
+                      </a:r>
+                      <a:endParaRPr lang="en-US" sz="1400" kern="150" dirty="0">
+                        <a:solidFill>
+                          <a:schemeClr val="dk1"/>
+                        </a:solidFill>
+                        <a:latin typeface="+mn-lt"/>
+                        <a:ea typeface="Droid Sans Fallback"/>
+                        <a:cs typeface="FreeSans"/>
+                      </a:endParaRPr>
+                    </a:p>
+                  </a:txBody>
+                  <a:tcPr>
+                    <a:solidFill>
+                      <a:schemeClr val="tx2">
+                        <a:lumMod val="25000"/>
+                        <a:lumOff val="75000"/>
+                      </a:schemeClr>
+                    </a:solidFill>
+                  </a:tcPr>
+                </a:tc>
+              </a:tr>
+              <a:tr h="1257073">
+                <a:tc>
+                  <a:txBody>
+                    <a:bodyPr/>
+                    <a:lstStyle/>
+                    <a:p>
+                      <a:r>
+                        <a:rPr lang="en-US" sz="1400" b="0" i="0" kern="1200" dirty="0" err="1" smtClean="0">
+                          <a:solidFill>
+                            <a:schemeClr val="dk1"/>
+                          </a:solidFill>
+                          <a:effectLst/>
+                          <a:latin typeface="+mn-lt"/>
+                          <a:ea typeface="+mn-ea"/>
+                          <a:cs typeface="+mn-cs"/>
+                        </a:rPr>
+                        <a:t>Institutt</a:t>
+                      </a:r>
+                      <a:r>
+                        <a:rPr lang="en-US" sz="1400" b="0" i="0" kern="1200" dirty="0" smtClean="0">
+                          <a:solidFill>
+                            <a:schemeClr val="dk1"/>
+                          </a:solidFill>
+                          <a:effectLst/>
+                          <a:latin typeface="+mn-lt"/>
+                          <a:ea typeface="+mn-ea"/>
+                          <a:cs typeface="+mn-cs"/>
+                        </a:rPr>
+                        <a:t> for </a:t>
+                      </a:r>
+                      <a:r>
+                        <a:rPr lang="en-US" sz="1400" b="0" i="0" kern="1200" dirty="0" err="1" smtClean="0">
+                          <a:solidFill>
+                            <a:schemeClr val="dk1"/>
+                          </a:solidFill>
+                          <a:effectLst/>
+                          <a:latin typeface="+mn-lt"/>
+                          <a:ea typeface="+mn-ea"/>
+                          <a:cs typeface="+mn-cs"/>
+                        </a:rPr>
+                        <a:t>datateknikk</a:t>
+                      </a:r>
+                      <a:r>
+                        <a:rPr lang="en-US" sz="1400" b="0" i="0" kern="1200" dirty="0" smtClean="0">
+                          <a:solidFill>
+                            <a:schemeClr val="dk1"/>
+                          </a:solidFill>
+                          <a:effectLst/>
+                          <a:latin typeface="+mn-lt"/>
+                          <a:ea typeface="+mn-ea"/>
+                          <a:cs typeface="+mn-cs"/>
+                        </a:rPr>
+                        <a:t> </a:t>
+                      </a:r>
+                      <a:r>
+                        <a:rPr lang="en-US" sz="1400" b="0" i="0" kern="1200" dirty="0" err="1" smtClean="0">
+                          <a:solidFill>
+                            <a:schemeClr val="dk1"/>
+                          </a:solidFill>
+                          <a:effectLst/>
+                          <a:latin typeface="+mn-lt"/>
+                          <a:ea typeface="+mn-ea"/>
+                          <a:cs typeface="+mn-cs"/>
+                        </a:rPr>
+                        <a:t>og</a:t>
+                      </a:r>
+                      <a:r>
+                        <a:rPr lang="en-US" sz="1400" b="0" i="0" kern="1200" dirty="0" smtClean="0">
+                          <a:solidFill>
+                            <a:schemeClr val="dk1"/>
+                          </a:solidFill>
+                          <a:effectLst/>
+                          <a:latin typeface="+mn-lt"/>
+                          <a:ea typeface="+mn-ea"/>
+                          <a:cs typeface="+mn-cs"/>
+                        </a:rPr>
+                        <a:t> </a:t>
+                      </a:r>
+                      <a:r>
+                        <a:rPr lang="en-US" sz="1400" b="0" i="0" kern="1200" dirty="0" err="1" smtClean="0">
+                          <a:solidFill>
+                            <a:schemeClr val="dk1"/>
+                          </a:solidFill>
+                          <a:effectLst/>
+                          <a:latin typeface="+mn-lt"/>
+                          <a:ea typeface="+mn-ea"/>
+                          <a:cs typeface="+mn-cs"/>
+                        </a:rPr>
+                        <a:t>informasjonsvitenskap</a:t>
+                      </a:r>
+                      <a:r>
+                        <a:rPr lang="en-US" sz="1400" b="0" i="0" kern="1200" dirty="0" smtClean="0">
+                          <a:solidFill>
+                            <a:schemeClr val="dk1"/>
+                          </a:solidFill>
+                          <a:effectLst/>
+                          <a:latin typeface="+mn-lt"/>
+                          <a:ea typeface="+mn-ea"/>
+                          <a:cs typeface="+mn-cs"/>
+                        </a:rPr>
+                        <a:t> , 2013</a:t>
+                      </a:r>
+                      <a:endParaRPr lang="en-US" sz="1400" b="0" i="0" u="none" strike="noStrike" kern="1200" dirty="0" smtClean="0">
+                        <a:solidFill>
+                          <a:schemeClr val="tx1"/>
+                        </a:solidFill>
+                        <a:effectLst/>
+                        <a:latin typeface="+mn-lt"/>
+                        <a:ea typeface="+mn-ea"/>
+                        <a:cs typeface="+mn-cs"/>
+                      </a:endParaRPr>
+                    </a:p>
+                  </a:txBody>
+                  <a:tcPr>
+                    <a:solidFill>
+                      <a:schemeClr val="tx2">
+                        <a:lumMod val="10000"/>
+                        <a:lumOff val="90000"/>
+                      </a:schemeClr>
+                    </a:solidFill>
+                  </a:tcPr>
+                </a:tc>
+                <a:tc>
+                  <a:txBody>
+                    <a:bodyPr/>
+                    <a:lstStyle/>
+                    <a:p>
+                      <a:r>
+                        <a:rPr lang="en-US" sz="1400" b="0" i="0" kern="1200" dirty="0" smtClean="0">
+                          <a:solidFill>
+                            <a:schemeClr val="dk1"/>
+                          </a:solidFill>
+                          <a:effectLst/>
+                          <a:latin typeface="+mn-lt"/>
+                          <a:ea typeface="+mn-ea"/>
+                          <a:cs typeface="+mn-cs"/>
+                        </a:rPr>
+                        <a:t>Authentication and Authorization for Native Mobile Applications using </a:t>
+                      </a:r>
+                      <a:r>
+                        <a:rPr lang="en-US" sz="1400" b="0" i="0" kern="1200" dirty="0" err="1" smtClean="0">
+                          <a:solidFill>
+                            <a:schemeClr val="dk1"/>
+                          </a:solidFill>
+                          <a:effectLst/>
+                          <a:latin typeface="+mn-lt"/>
+                          <a:ea typeface="+mn-ea"/>
+                          <a:cs typeface="+mn-cs"/>
+                        </a:rPr>
+                        <a:t>OAuth</a:t>
+                      </a:r>
+                      <a:r>
+                        <a:rPr lang="en-US" sz="1400" b="0" i="0" kern="1200" dirty="0" smtClean="0">
+                          <a:solidFill>
+                            <a:schemeClr val="dk1"/>
+                          </a:solidFill>
+                          <a:effectLst/>
+                          <a:latin typeface="+mn-lt"/>
+                          <a:ea typeface="+mn-ea"/>
+                          <a:cs typeface="+mn-cs"/>
+                        </a:rPr>
+                        <a:t> 2.0</a:t>
+                      </a:r>
+                      <a:endParaRPr lang="en-US" sz="1400" b="0" i="0" kern="1200" dirty="0">
+                        <a:solidFill>
+                          <a:schemeClr val="dk1"/>
+                        </a:solidFill>
+                        <a:effectLst/>
+                        <a:latin typeface="+mn-lt"/>
+                        <a:ea typeface="+mn-ea"/>
+                        <a:cs typeface="+mn-cs"/>
+                      </a:endParaRPr>
+                    </a:p>
+                  </a:txBody>
+                  <a:tcPr>
+                    <a:solidFill>
+                      <a:schemeClr val="tx2">
+                        <a:lumMod val="10000"/>
+                        <a:lumOff val="90000"/>
+                      </a:schemeClr>
+                    </a:solidFill>
+                  </a:tcPr>
+                </a:tc>
+                <a:tc>
+                  <a:txBody>
+                    <a:bodyPr/>
+                    <a:lstStyle/>
+                    <a:p>
+                      <a:r>
+                        <a:rPr lang="en-US" sz="1400" b="0" i="0" u="none" strike="noStrike" kern="1200" dirty="0" err="1" smtClean="0">
+                          <a:solidFill>
+                            <a:schemeClr val="dk1"/>
+                          </a:solidFill>
+                          <a:effectLst/>
+                          <a:latin typeface="+mn-lt"/>
+                          <a:ea typeface="+mn-ea"/>
+                          <a:cs typeface="+mn-cs"/>
+                        </a:rPr>
+                        <a:t>Aas</a:t>
+                      </a:r>
+                      <a:r>
+                        <a:rPr lang="en-US" sz="1400" b="0" i="0" u="none" strike="noStrike" kern="1200" dirty="0" smtClean="0">
+                          <a:solidFill>
+                            <a:schemeClr val="dk1"/>
+                          </a:solidFill>
+                          <a:effectLst/>
+                          <a:latin typeface="+mn-lt"/>
+                          <a:ea typeface="+mn-ea"/>
+                          <a:cs typeface="+mn-cs"/>
+                        </a:rPr>
+                        <a:t>, Dag-</a:t>
+                      </a:r>
+                      <a:r>
+                        <a:rPr lang="en-US" sz="1400" b="0" i="0" u="none" strike="noStrike" kern="1200" dirty="0" err="1" smtClean="0">
+                          <a:solidFill>
+                            <a:schemeClr val="dk1"/>
+                          </a:solidFill>
+                          <a:effectLst/>
+                          <a:latin typeface="+mn-lt"/>
+                          <a:ea typeface="+mn-ea"/>
+                          <a:cs typeface="+mn-cs"/>
+                        </a:rPr>
+                        <a:t>Inge</a:t>
+                      </a:r>
+                      <a:endParaRPr lang="en-US" sz="1400" b="0" i="0" u="none" strike="noStrike" kern="1200" dirty="0">
+                        <a:solidFill>
+                          <a:schemeClr val="dk1"/>
+                        </a:solidFill>
+                        <a:effectLst/>
+                        <a:latin typeface="+mn-lt"/>
+                        <a:ea typeface="+mn-ea"/>
+                        <a:cs typeface="+mn-cs"/>
+                      </a:endParaRPr>
+                    </a:p>
+                  </a:txBody>
+                  <a:tcPr>
+                    <a:solidFill>
+                      <a:schemeClr val="tx2">
+                        <a:lumMod val="10000"/>
+                        <a:lumOff val="90000"/>
+                      </a:schemeClr>
+                    </a:solidFill>
+                  </a:tcPr>
+                </a:tc>
+                <a:tc>
+                  <a:txBody>
+                    <a:bodyPr/>
+                    <a:lstStyle/>
+                    <a:p>
+                      <a:r>
+                        <a:rPr kumimoji="0" lang="en-IN" sz="1400" kern="1200" dirty="0" smtClean="0">
+                          <a:solidFill>
+                            <a:schemeClr val="dk1"/>
+                          </a:solidFill>
+                          <a:latin typeface="+mn-lt"/>
+                          <a:ea typeface="+mn-ea"/>
+                          <a:cs typeface="+mn-cs"/>
+                        </a:rPr>
+                        <a:t>Improving existing model</a:t>
+                      </a:r>
+                      <a:endParaRPr kumimoji="0" lang="en-US" sz="1400" kern="1200" dirty="0">
+                        <a:solidFill>
+                          <a:schemeClr val="dk1"/>
+                        </a:solidFill>
+                        <a:latin typeface="+mn-lt"/>
+                        <a:ea typeface="+mn-ea"/>
+                        <a:cs typeface="+mn-cs"/>
+                      </a:endParaRPr>
+                    </a:p>
+                  </a:txBody>
+                  <a:tcPr>
+                    <a:solidFill>
+                      <a:schemeClr val="tx2">
+                        <a:lumMod val="10000"/>
+                        <a:lumOff val="90000"/>
+                      </a:schemeClr>
+                    </a:solidFill>
+                  </a:tcPr>
+                </a:tc>
+                <a:tc>
+                  <a:txBody>
+                    <a:bodyPr/>
+                    <a:lstStyle/>
+                    <a:p>
+                      <a:r>
+                        <a:rPr kumimoji="0" lang="en-IN" sz="1400" kern="1200" dirty="0" smtClean="0">
+                          <a:solidFill>
+                            <a:schemeClr val="dk1"/>
+                          </a:solidFill>
+                          <a:latin typeface="+mn-lt"/>
+                          <a:ea typeface="+mn-ea"/>
+                          <a:cs typeface="+mn-cs"/>
+                        </a:rPr>
+                        <a:t>There are more security</a:t>
+                      </a:r>
+                      <a:r>
+                        <a:rPr kumimoji="0" lang="en-IN" sz="1400" kern="1200" baseline="0" dirty="0" smtClean="0">
+                          <a:solidFill>
+                            <a:schemeClr val="dk1"/>
+                          </a:solidFill>
+                          <a:latin typeface="+mn-lt"/>
+                          <a:ea typeface="+mn-ea"/>
+                          <a:cs typeface="+mn-cs"/>
+                        </a:rPr>
+                        <a:t> vulnerabilities for native mobile apps than </a:t>
+                      </a:r>
+                      <a:r>
+                        <a:rPr kumimoji="0" lang="en-IN" sz="1400" kern="1200" baseline="0" dirty="0" err="1" smtClean="0">
+                          <a:solidFill>
+                            <a:schemeClr val="dk1"/>
+                          </a:solidFill>
+                          <a:latin typeface="+mn-lt"/>
+                          <a:ea typeface="+mn-ea"/>
+                          <a:cs typeface="+mn-cs"/>
+                        </a:rPr>
+                        <a:t>webapps</a:t>
+                      </a:r>
+                      <a:endParaRPr lang="en-US" sz="1400" dirty="0">
+                        <a:latin typeface="+mn-lt"/>
+                      </a:endParaRPr>
+                    </a:p>
+                  </a:txBody>
+                  <a:tcPr marL="34925" marR="34925" marT="34925" marB="34925">
+                    <a:solidFill>
+                      <a:schemeClr val="tx2">
+                        <a:lumMod val="10000"/>
+                        <a:lumOff val="90000"/>
+                      </a:schemeClr>
+                    </a:solidFill>
+                  </a:tcPr>
+                </a:tc>
+                <a:tc>
+                  <a:txBody>
+                    <a:bodyPr/>
+                    <a:lstStyle/>
+                    <a:p>
+                      <a:pPr marL="0" marR="0">
+                        <a:spcBef>
+                          <a:spcPts val="0"/>
+                        </a:spcBef>
+                        <a:spcAft>
+                          <a:spcPts val="0"/>
+                        </a:spcAft>
+                      </a:pPr>
+                      <a:r>
+                        <a:rPr lang="en-US" sz="1400" kern="150" dirty="0" smtClean="0">
+                          <a:latin typeface="+mn-lt"/>
+                          <a:ea typeface="Droid Sans Fallback"/>
+                          <a:cs typeface="FreeSans"/>
+                        </a:rPr>
+                        <a:t>The proposed improvement is specific to only Android OS</a:t>
+                      </a:r>
+                      <a:endParaRPr lang="en-US" sz="1400" kern="150" dirty="0">
+                        <a:latin typeface="+mn-lt"/>
+                        <a:ea typeface="Droid Sans Fallback"/>
+                        <a:cs typeface="FreeSans"/>
+                      </a:endParaRPr>
+                    </a:p>
+                  </a:txBody>
+                  <a:tcPr marL="34925" marR="34925" marT="34925" marB="34925">
+                    <a:solidFill>
+                      <a:schemeClr val="tx2">
+                        <a:lumMod val="10000"/>
+                        <a:lumOff val="90000"/>
+                      </a:schemeClr>
+                    </a:solidFill>
+                  </a:tcPr>
+                </a:tc>
+              </a:tr>
+            </a:tbl>
+          </a:graphicData>
+        </a:graphic>
+      </p:graphicFrame>
+      <p:sp>
+        <p:nvSpPr>
+          <p:cNvPr id="5" name="Title 1"/>
+          <p:cNvSpPr txBox="1">
+            <a:spLocks/>
+          </p:cNvSpPr>
+          <p:nvPr/>
+        </p:nvSpPr>
+        <p:spPr>
+          <a:xfrm>
+            <a:off x="457200" y="304800"/>
+            <a:ext cx="8534400" cy="758952"/>
+          </a:xfrm>
+          <a:prstGeom prst="rect">
+            <a:avLst/>
+          </a:prstGeom>
+        </p:spPr>
+        <p:txBody>
+          <a:bodyPr vert="horz" lIns="91440" tIns="45720" rIns="91440" bIns="45720" rtlCol="0" anchor="ctr">
+            <a:normAutofit lnSpcReduction="10000"/>
+          </a:bodyPr>
+          <a:lstStyle>
+            <a:lvl1pPr algn="ctr" defTabSz="914400" rtl="0" eaLnBrk="1" latinLnBrk="0" hangingPunct="1">
+              <a:spcBef>
+                <a:spcPct val="0"/>
+              </a:spcBef>
+              <a:buNone/>
+              <a:defRPr sz="4400" kern="1200">
+                <a:solidFill>
+                  <a:schemeClr val="tx1"/>
+                </a:solidFill>
+                <a:latin typeface="+mj-lt"/>
+                <a:ea typeface="+mj-ea"/>
+                <a:cs typeface="+mj-cs"/>
+              </a:defRPr>
+            </a:lvl1pPr>
+          </a:lstStyle>
+          <a:p>
+            <a:pPr algn="l"/>
+            <a:r>
+              <a:rPr lang="en-US" dirty="0" smtClean="0"/>
+              <a:t>Literature Survey</a:t>
+            </a:r>
+            <a:endParaRPr lang="en-US" dirty="0"/>
+          </a:p>
+        </p:txBody>
+      </p:sp>
+      <p:sp>
+        <p:nvSpPr>
+          <p:cNvPr id="2" name="Slide Number Placeholder 1"/>
+          <p:cNvSpPr>
+            <a:spLocks noGrp="1"/>
+          </p:cNvSpPr>
+          <p:nvPr>
+            <p:ph type="sldNum" sz="quarter" idx="12"/>
+          </p:nvPr>
+        </p:nvSpPr>
+        <p:spPr/>
+        <p:txBody>
+          <a:bodyPr/>
+          <a:lstStyle/>
+          <a:p>
+            <a:fld id="{3E144E38-9B7E-4F9B-8E28-ACBFB64687FB}" type="slidenum">
+              <a:rPr lang="en-US" smtClean="0"/>
+              <a:t>4</a:t>
+            </a:fld>
+            <a:endParaRPr lang="en-US"/>
+          </a:p>
+        </p:txBody>
+      </p:sp>
+    </p:spTree>
+    <p:extLst>
+      <p:ext uri="{BB962C8B-B14F-4D97-AF65-F5344CB8AC3E}">
+        <p14:creationId xmlns:p14="http://schemas.microsoft.com/office/powerpoint/2010/main" val="1269400346"/>
       </p:ext>
     </p:extLst>
   </p:cSld>
@@ -5257,4 +7848,265 @@
   <a:objectDefaults/>
   <a:extraClrSchemeLst/>
 </a:theme>
+</file>
+
+<file path=ppt/theme/theme2.xml><?xml version="1.0" encoding="utf-8"?>
+<a:theme xmlns:a="http://schemas.openxmlformats.org/drawingml/2006/main" name="Office Theme">
+  <a:themeElements>
+    <a:clrScheme name="Office">
+      <a:dk1>
+        <a:sysClr val="windowText" lastClr="000000"/>
+      </a:dk1>
+      <a:lt1>
+        <a:sysClr val="window" lastClr="FFFFFF"/>
+      </a:lt1>
+      <a:dk2>
+        <a:srgbClr val="44546A"/>
+      </a:dk2>
+      <a:lt2>
+        <a:srgbClr val="E7E6E6"/>
+      </a:lt2>
+      <a:accent1>
+        <a:srgbClr val="5B9BD5"/>
+      </a:accent1>
+      <a:accent2>
+        <a:srgbClr val="ED7D31"/>
+      </a:accent2>
+      <a:accent3>
+        <a:srgbClr val="A5A5A5"/>
+      </a:accent3>
+      <a:accent4>
+        <a:srgbClr val="FFC000"/>
+      </a:accent4>
+      <a:accent5>
+        <a:srgbClr val="4472C4"/>
+      </a:accent5>
+      <a:accent6>
+        <a:srgbClr val="70AD47"/>
+      </a:accent6>
+      <a:hlink>
+        <a:srgbClr val="0563C1"/>
+      </a:hlink>
+      <a:folHlink>
+        <a:srgbClr val="954F72"/>
+      </a:folHlink>
+    </a:clrScheme>
+    <a:fontScheme name="Office">
+      <a:majorFont>
+        <a:latin typeface="Calibri Light" panose="020F0302020204030204"/>
+        <a:ea typeface=""/>
+        <a:cs typeface=""/>
+        <a:font script="Jpan" typeface="ＭＳ Ｐゴシック"/>
+        <a:font script="Hang" typeface="맑은 고딕"/>
+        <a:font script="Hans" typeface="宋体"/>
+        <a:font script="Hant" typeface="新細明體"/>
+        <a:font script="Arab" typeface="Times New Roman"/>
+        <a:font script="Hebr" typeface="Times New Roman"/>
+        <a:font script="Thai" typeface="Angsana New"/>
+        <a:font script="Ethi" typeface="Nyala"/>
+        <a:font script="Beng" typeface="Vrinda"/>
+        <a:font script="Gujr" typeface="Shruti"/>
+        <a:font script="Khmr" typeface="MoolBoran"/>
+        <a:font script="Knda" typeface="Tunga"/>
+        <a:font script="Guru" typeface="Raavi"/>
+        <a:font script="Cans" typeface="Euphemia"/>
+        <a:font script="Cher" typeface="Plantagenet Cherokee"/>
+        <a:font script="Yiii" typeface="Microsoft Yi Baiti"/>
+        <a:font script="Tibt" typeface="Microsoft Himalaya"/>
+        <a:font script="Thaa" typeface="MV Boli"/>
+        <a:font script="Deva" typeface="Mangal"/>
+        <a:font script="Telu" typeface="Gautami"/>
+        <a:font script="Taml" typeface="Latha"/>
+        <a:font script="Syrc" typeface="Estrangelo Edessa"/>
+        <a:font script="Orya" typeface="Kalinga"/>
+        <a:font script="Mlym" typeface="Kartika"/>
+        <a:font script="Laoo" typeface="DokChampa"/>
+        <a:font script="Sinh" typeface="Iskoola Pota"/>
+        <a:font script="Mong" typeface="Mongolian Baiti"/>
+        <a:font script="Viet" typeface="Times New Roman"/>
+        <a:font script="Uigh" typeface="Microsoft Uighur"/>
+        <a:font script="Geor" typeface="Sylfaen"/>
+      </a:majorFont>
+      <a:minorFont>
+        <a:latin typeface="Calibri" panose="020F0502020204030204"/>
+        <a:ea typeface=""/>
+        <a:cs typeface=""/>
+        <a:font script="Jpan" typeface="ＭＳ Ｐゴシック"/>
+        <a:font script="Hang" typeface="맑은 고딕"/>
+        <a:font script="Hans" typeface="宋体"/>
+        <a:font script="Hant" typeface="新細明體"/>
+        <a:font script="Arab" typeface="Arial"/>
+        <a:font script="Hebr" typeface="Arial"/>
+        <a:font script="Thai" typeface="Cordia New"/>
+        <a:font script="Ethi" typeface="Nyala"/>
+        <a:font script="Beng" typeface="Vrinda"/>
+        <a:font script="Gujr" typeface="Shruti"/>
+        <a:font script="Khmr" typeface="DaunPenh"/>
+        <a:font script="Knda" typeface="Tunga"/>
+        <a:font script="Guru" typeface="Raavi"/>
+        <a:font script="Cans" typeface="Euphemia"/>
+        <a:font script="Cher" typeface="Plantagenet Cherokee"/>
+        <a:font script="Yiii" typeface="Microsoft Yi Baiti"/>
+        <a:font script="Tibt" typeface="Microsoft Himalaya"/>
+        <a:font script="Thaa" typeface="MV Boli"/>
+        <a:font script="Deva" typeface="Mangal"/>
+        <a:font script="Telu" typeface="Gautami"/>
+        <a:font script="Taml" typeface="Latha"/>
+        <a:font script="Syrc" typeface="Estrangelo Edessa"/>
+        <a:font script="Orya" typeface="Kalinga"/>
+        <a:font script="Mlym" typeface="Kartika"/>
+        <a:font script="Laoo" typeface="DokChampa"/>
+        <a:font script="Sinh" typeface="Iskoola Pota"/>
+        <a:font script="Mong" typeface="Mongolian Baiti"/>
+        <a:font script="Viet" typeface="Arial"/>
+        <a:font script="Uigh" typeface="Microsoft Uighur"/>
+        <a:font script="Geor" typeface="Sylfaen"/>
+      </a:minorFont>
+    </a:fontScheme>
+    <a:fmtScheme name="Office">
+      <a:fillStyleLst>
+        <a:solidFill>
+          <a:schemeClr val="phClr"/>
+        </a:solidFill>
+        <a:gradFill rotWithShape="1">
+          <a:gsLst>
+            <a:gs pos="0">
+              <a:schemeClr val="phClr">
+                <a:lumMod val="110000"/>
+                <a:satMod val="105000"/>
+                <a:tint val="67000"/>
+              </a:schemeClr>
+            </a:gs>
+            <a:gs pos="50000">
+              <a:schemeClr val="phClr">
+                <a:lumMod val="105000"/>
+                <a:satMod val="103000"/>
+                <a:tint val="73000"/>
+              </a:schemeClr>
+            </a:gs>
+            <a:gs pos="100000">
+              <a:schemeClr val="phClr">
+                <a:lumMod val="105000"/>
+                <a:satMod val="109000"/>
+                <a:tint val="81000"/>
+              </a:schemeClr>
+            </a:gs>
+          </a:gsLst>
+          <a:lin ang="5400000" scaled="0"/>
+        </a:gradFill>
+        <a:gradFill rotWithShape="1">
+          <a:gsLst>
+            <a:gs pos="0">
+              <a:schemeClr val="phClr">
+                <a:satMod val="103000"/>
+                <a:lumMod val="102000"/>
+                <a:tint val="94000"/>
+              </a:schemeClr>
+            </a:gs>
+            <a:gs pos="50000">
+              <a:schemeClr val="phClr">
+                <a:satMod val="110000"/>
+                <a:lumMod val="100000"/>
+                <a:shade val="100000"/>
+              </a:schemeClr>
+            </a:gs>
+            <a:gs pos="100000">
+              <a:schemeClr val="phClr">
+                <a:lumMod val="99000"/>
+                <a:satMod val="120000"/>
+                <a:shade val="78000"/>
+              </a:schemeClr>
+            </a:gs>
+          </a:gsLst>
+          <a:lin ang="5400000" scaled="0"/>
+        </a:gradFill>
+      </a:fillStyleLst>
+      <a:lnStyleLst>
+        <a:ln w="6350" cap="flat" cmpd="sng" algn="ctr">
+          <a:solidFill>
+            <a:schemeClr val="phClr"/>
+          </a:solidFill>
+          <a:prstDash val="solid"/>
+          <a:miter lim="800000"/>
+        </a:ln>
+        <a:ln w="12700" cap="flat" cmpd="sng" algn="ctr">
+          <a:solidFill>
+            <a:schemeClr val="phClr"/>
+          </a:solidFill>
+          <a:prstDash val="solid"/>
+          <a:miter lim="800000"/>
+        </a:ln>
+        <a:ln w="19050" cap="flat" cmpd="sng" algn="ctr">
+          <a:solidFill>
+            <a:schemeClr val="phClr"/>
+          </a:solidFill>
+          <a:prstDash val="solid"/>
+          <a:miter lim="800000"/>
+        </a:ln>
+      </a:lnStyleLst>
+      <a:effectStyleLst>
+        <a:effectStyle>
+          <a:effectLst/>
+        </a:effectStyle>
+        <a:effectStyle>
+          <a:effectLst/>
+        </a:effectStyle>
+        <a:effectStyle>
+          <a:effectLst>
+            <a:outerShdw blurRad="57150" dist="19050" dir="5400000" algn="ctr" rotWithShape="0">
+              <a:srgbClr val="000000">
+                <a:alpha val="63000"/>
+              </a:srgbClr>
+            </a:outerShdw>
+          </a:effectLst>
+        </a:effectStyle>
+      </a:effectStyleLst>
+      <a:bgFillStyleLst>
+        <a:solidFill>
+          <a:schemeClr val="phClr"/>
+        </a:solidFill>
+        <a:solidFill>
+          <a:schemeClr val="phClr">
+            <a:tint val="95000"/>
+            <a:satMod val="170000"/>
+          </a:schemeClr>
+        </a:solidFill>
+        <a:gradFill rotWithShape="1">
+          <a:gsLst>
+            <a:gs pos="0">
+              <a:schemeClr val="phClr">
+                <a:tint val="93000"/>
+                <a:satMod val="150000"/>
+                <a:shade val="98000"/>
+                <a:lumMod val="102000"/>
+              </a:schemeClr>
+            </a:gs>
+            <a:gs pos="50000">
+              <a:schemeClr val="phClr">
+                <a:tint val="98000"/>
+                <a:satMod val="130000"/>
+                <a:shade val="90000"/>
+                <a:lumMod val="103000"/>
+              </a:schemeClr>
+            </a:gs>
+            <a:gs pos="100000">
+              <a:schemeClr val="phClr">
+                <a:shade val="63000"/>
+                <a:satMod val="120000"/>
+              </a:schemeClr>
+            </a:gs>
+          </a:gsLst>
+          <a:lin ang="5400000" scaled="0"/>
+        </a:gradFill>
+      </a:bgFillStyleLst>
+    </a:fmtScheme>
+  </a:themeElements>
+  <a:objectDefaults/>
+  <a:extraClrSchemeLst/>
+  <a:extLst>
+    <a:ext uri="{05A4C25C-085E-4340-85A3-A5531E510DB2}">
+      <thm15:themeFamily xmlns:thm15="http://schemas.microsoft.com/office/thememl/2012/main" name="Office Theme" id="{62F939B6-93AF-4DB8-9C6B-D6C7DFDC589F}" vid="{4A3C46E8-61CC-4603-A589-7422A47A8E4A}"/>
+    </a:ext>
+  </a:extLst>
+</a:theme>
 </file>
</xml_diff>